<commit_message>
The material was revised.
</commit_message>
<xml_diff>
--- a/2021-02-15_Makita_ModelingPSOCT/OCTpaperClub202102_makita.pptx
+++ b/2021-02-15_Makita_ModelingPSOCT/OCTpaperClub202102_makita.pptx
@@ -6,10 +6,10 @@
     <p:sldMasterId id="2147483802" r:id="rId2"/>
   </p:sldMasterIdLst>
   <p:notesMasterIdLst>
-    <p:notesMasterId r:id="rId11"/>
+    <p:notesMasterId r:id="rId12"/>
   </p:notesMasterIdLst>
   <p:handoutMasterIdLst>
-    <p:handoutMasterId r:id="rId12"/>
+    <p:handoutMasterId r:id="rId13"/>
   </p:handoutMasterIdLst>
   <p:sldIdLst>
     <p:sldId id="256" r:id="rId3"/>
@@ -18,8 +18,9 @@
     <p:sldId id="265" r:id="rId6"/>
     <p:sldId id="267" r:id="rId7"/>
     <p:sldId id="268" r:id="rId8"/>
-    <p:sldId id="269" r:id="rId9"/>
-    <p:sldId id="264" r:id="rId10"/>
+    <p:sldId id="270" r:id="rId9"/>
+    <p:sldId id="269" r:id="rId10"/>
+    <p:sldId id="264" r:id="rId11"/>
   </p:sldIdLst>
   <p:sldSz cx="12192000" cy="6858000"/>
   <p:notesSz cx="6858000" cy="9144000"/>
@@ -1085,7 +1086,7 @@
               <a:pPr>
                 <a:defRPr/>
               </a:pPr>
-              <a:t>2021/2/15</a:t>
+              <a:t>2021/2/19</a:t>
             </a:fld>
             <a:endParaRPr lang="ja-JP" altLang="en-US" dirty="0"/>
           </a:p>
@@ -1304,7 +1305,7 @@
               <a:pPr>
                 <a:defRPr/>
               </a:pPr>
-              <a:t>2021/2/15</a:t>
+              <a:t>2021/2/19</a:t>
             </a:fld>
             <a:endParaRPr lang="ja-JP" altLang="en-US" dirty="0"/>
           </a:p>
@@ -25406,7 +25407,7 @@
         </p:blipFill>
         <p:spPr>
           <a:xfrm>
-            <a:off x="6133291" y="845696"/>
+            <a:off x="6133291" y="769257"/>
             <a:ext cx="5952565" cy="4195482"/>
           </a:xfrm>
           <a:prstGeom prst="rect">
@@ -25428,7 +25429,7 @@
         </p:nvSpPr>
         <p:spPr>
           <a:xfrm>
-            <a:off x="6839129" y="5041178"/>
+            <a:off x="6839129" y="4964739"/>
             <a:ext cx="5246727" cy="646331"/>
           </a:xfrm>
           <a:prstGeom prst="rect">
@@ -25494,8 +25495,8 @@
         </p:nvSpPr>
         <p:spPr>
           <a:xfrm>
-            <a:off x="0" y="1698171"/>
-            <a:ext cx="1893467" cy="461665"/>
+            <a:off x="-2" y="2203976"/>
+            <a:ext cx="1893467" cy="830997"/>
           </a:xfrm>
           <a:prstGeom prst="rect">
             <a:avLst/>
@@ -25641,6 +25642,20 @@
               </a:rPr>
               <a:t>2</a:t>
             </a:r>
+          </a:p>
+          <a:p>
+            <a:pPr algn="ctr"/>
+            <a:r>
+              <a:rPr kumimoji="1" lang="en-US" altLang="ja-JP" sz="2400" dirty="0">
+                <a:solidFill>
+                  <a:srgbClr val="212733"/>
+                </a:solidFill>
+                <a:latin typeface="+mn-lt"/>
+                <a:ea typeface="+mn-ea"/>
+                <a:cs typeface="Arial" panose="020B0604020202020204" pitchFamily="34" charset="0"/>
+              </a:rPr>
+              <a:t>(Wave Co.)</a:t>
+            </a:r>
             <a:endParaRPr kumimoji="1" lang="ja-JP" altLang="en-US" sz="2400" dirty="0">
               <a:solidFill>
                 <a:srgbClr val="212733"/>
@@ -25666,7 +25681,7 @@
         </p:nvSpPr>
         <p:spPr>
           <a:xfrm>
-            <a:off x="1716788" y="2301073"/>
+            <a:off x="1847416" y="2191438"/>
             <a:ext cx="2133918" cy="830997"/>
           </a:xfrm>
           <a:prstGeom prst="rect">
@@ -25740,7 +25755,7 @@
         </p:nvSpPr>
         <p:spPr>
           <a:xfrm>
-            <a:off x="4415354" y="2347237"/>
+            <a:off x="4385602" y="2163339"/>
             <a:ext cx="1196161" cy="830997"/>
           </a:xfrm>
           <a:prstGeom prst="rect">
@@ -25805,7 +25820,7 @@
         </p:nvSpPr>
         <p:spPr>
           <a:xfrm>
-            <a:off x="1905140" y="1204846"/>
+            <a:off x="2095080" y="1204846"/>
             <a:ext cx="1638590" cy="461665"/>
           </a:xfrm>
           <a:prstGeom prst="rect">
@@ -25867,7 +25882,7 @@
         </p:nvSpPr>
         <p:spPr>
           <a:xfrm>
-            <a:off x="3893578" y="1204845"/>
+            <a:off x="3999374" y="1204845"/>
             <a:ext cx="1968617" cy="461665"/>
           </a:xfrm>
           <a:prstGeom prst="rect">
@@ -25918,8 +25933,8 @@
         </p:nvSpPr>
         <p:spPr>
           <a:xfrm>
-            <a:off x="0" y="3440003"/>
-            <a:ext cx="1893467" cy="461665"/>
+            <a:off x="-2" y="4607418"/>
+            <a:ext cx="1893467" cy="830997"/>
           </a:xfrm>
           <a:prstGeom prst="rect">
             <a:avLst/>
@@ -26065,6 +26080,20 @@
               </a:rPr>
               <a:t>3</a:t>
             </a:r>
+          </a:p>
+          <a:p>
+            <a:pPr algn="ctr"/>
+            <a:r>
+              <a:rPr lang="en-US" altLang="ja-JP" sz="2400" dirty="0">
+                <a:solidFill>
+                  <a:srgbClr val="212733"/>
+                </a:solidFill>
+                <a:latin typeface="+mn-lt"/>
+                <a:ea typeface="+mn-ea"/>
+                <a:cs typeface="Arial" panose="020B0604020202020204" pitchFamily="34" charset="0"/>
+              </a:rPr>
+              <a:t>(Lab. Co.)</a:t>
+            </a:r>
             <a:endParaRPr kumimoji="1" lang="ja-JP" altLang="en-US" sz="2400" dirty="0">
               <a:solidFill>
                 <a:srgbClr val="212733"/>
@@ -26090,7 +26119,7 @@
         </p:nvSpPr>
         <p:spPr>
           <a:xfrm>
-            <a:off x="4212041" y="4112236"/>
+            <a:off x="4145953" y="4112236"/>
             <a:ext cx="1675459" cy="830997"/>
           </a:xfrm>
           <a:prstGeom prst="rect">
@@ -26166,7 +26195,7 @@
         </p:nvSpPr>
         <p:spPr>
           <a:xfrm>
-            <a:off x="2944326" y="5653154"/>
+            <a:off x="4491772" y="5999718"/>
             <a:ext cx="3541885" cy="646331"/>
           </a:xfrm>
           <a:prstGeom prst="rect">
@@ -26234,7 +26263,7 @@
             </p:nvSpPr>
             <p:spPr>
               <a:xfrm>
-                <a:off x="4476826" y="5223677"/>
+                <a:off x="4410737" y="5570240"/>
                 <a:ext cx="1145890" cy="429477"/>
               </a:xfrm>
               <a:prstGeom prst="rect">
@@ -26396,7 +26425,7 @@
             </p:nvSpPr>
             <p:spPr>
               <a:xfrm>
-                <a:off x="4476826" y="5223677"/>
+                <a:off x="4410737" y="5570240"/>
                 <a:ext cx="1145890" cy="429477"/>
               </a:xfrm>
               <a:prstGeom prst="rect">
@@ -26405,7 +26434,7 @@
               <a:blipFill>
                 <a:blip r:embed="rId3"/>
                 <a:stretch>
-                  <a:fillRect b="-1429"/>
+                  <a:fillRect/>
                 </a:stretch>
               </a:blipFill>
             </p:spPr>
@@ -26424,6 +26453,74 @@
           </p:sp>
         </mc:Fallback>
       </mc:AlternateContent>
+      <p:cxnSp>
+        <p:nvCxnSpPr>
+          <p:cNvPr id="5" name="Straight Connector 4">
+            <a:extLst>
+              <a:ext uri="{FF2B5EF4-FFF2-40B4-BE49-F238E27FC236}">
+                <a16:creationId xmlns:a16="http://schemas.microsoft.com/office/drawing/2014/main" id="{D9EF1DFE-FAA0-4B61-9E3B-F6B464A285B0}"/>
+              </a:ext>
+            </a:extLst>
+          </p:cNvPr>
+          <p:cNvCxnSpPr/>
+          <p:nvPr/>
+        </p:nvCxnSpPr>
+        <p:spPr bwMode="auto">
+          <a:xfrm>
+            <a:off x="90435" y="1666510"/>
+            <a:ext cx="6005565" cy="0"/>
+          </a:xfrm>
+          <a:prstGeom prst="line">
+            <a:avLst/>
+          </a:prstGeom>
+          <a:noFill/>
+          <a:ln w="12700" cap="flat" cmpd="sng" algn="ctr">
+            <a:solidFill>
+              <a:srgbClr val="212733"/>
+            </a:solidFill>
+            <a:prstDash val="solid"/>
+            <a:round/>
+            <a:headEnd type="none" w="med" len="med"/>
+            <a:tailEnd type="none"/>
+          </a:ln>
+          <a:effectLst/>
+        </p:spPr>
+      </p:cxnSp>
+      <p:cxnSp>
+        <p:nvCxnSpPr>
+          <p:cNvPr id="18" name="Straight Connector 17">
+            <a:extLst>
+              <a:ext uri="{FF2B5EF4-FFF2-40B4-BE49-F238E27FC236}">
+                <a16:creationId xmlns:a16="http://schemas.microsoft.com/office/drawing/2014/main" id="{EC15E617-B09D-4F64-9CE3-44D4C8B7948B}"/>
+              </a:ext>
+            </a:extLst>
+          </p:cNvPr>
+          <p:cNvCxnSpPr>
+            <a:cxnSpLocks/>
+          </p:cNvCxnSpPr>
+          <p:nvPr/>
+        </p:nvCxnSpPr>
+        <p:spPr bwMode="auto">
+          <a:xfrm>
+            <a:off x="1847416" y="1306286"/>
+            <a:ext cx="0" cy="5084466"/>
+          </a:xfrm>
+          <a:prstGeom prst="line">
+            <a:avLst/>
+          </a:prstGeom>
+          <a:noFill/>
+          <a:ln w="12700" cap="flat" cmpd="sng" algn="ctr">
+            <a:solidFill>
+              <a:srgbClr val="212733"/>
+            </a:solidFill>
+            <a:prstDash val="solid"/>
+            <a:round/>
+            <a:headEnd type="none" w="med" len="med"/>
+            <a:tailEnd type="none"/>
+          </a:ln>
+          <a:effectLst/>
+        </p:spPr>
+      </p:cxnSp>
     </p:spTree>
     <p:extLst>
       <p:ext uri="{BB962C8B-B14F-4D97-AF65-F5344CB8AC3E}">
@@ -26473,7 +26570,7 @@
         <p:spPr>
           <a:xfrm>
             <a:off x="5" y="123832"/>
-            <a:ext cx="7599316" cy="507700"/>
+            <a:ext cx="7660230" cy="507700"/>
           </a:xfrm>
         </p:spPr>
         <p:txBody>
@@ -26482,7 +26579,7 @@
           <a:p>
             <a:r>
               <a:rPr kumimoji="1" lang="en-US" altLang="ja-JP" dirty="0"/>
-              <a:t>Round-trip propagation in Jones notation</a:t>
+              <a:t>Round-trip propagation (wave coordinate)</a:t>
             </a:r>
             <a:endParaRPr kumimoji="1" lang="ja-JP" altLang="en-US" dirty="0"/>
           </a:p>
@@ -26504,8 +26601,8 @@
             </p:nvSpPr>
             <p:spPr>
               <a:xfrm>
-                <a:off x="1429241" y="812693"/>
-                <a:ext cx="1890133" cy="465384"/>
+                <a:off x="1291575" y="812693"/>
+                <a:ext cx="2165465" cy="465384"/>
               </a:xfrm>
               <a:prstGeom prst="rect">
                 <a:avLst/>
@@ -26551,7 +26648,7 @@
                               <a:ea typeface="+mn-ea"/>
                               <a:cs typeface="Arial" panose="020B0604020202020204" pitchFamily="34" charset="0"/>
                             </a:rPr>
-                            <m:t>J</m:t>
+                            <m:t>T</m:t>
                           </m:r>
                         </m:e>
                         <m:sub>
@@ -26593,9 +26690,6 @@
                         </m:sSubPr>
                         <m:e>
                           <m:r>
-                            <m:rPr>
-                              <m:nor/>
-                            </m:rPr>
                             <a:rPr lang="en-US" altLang="ja-JP" sz="2800" b="1" i="0" smtClean="0">
                               <a:solidFill>
                                 <a:srgbClr val="212733"/>
@@ -26603,7 +26697,7 @@
                               <a:latin typeface="Cambria Math" panose="02040503050406030204" pitchFamily="18" charset="0"/>
                               <a:cs typeface="Arial" panose="020B0604020202020204" pitchFamily="34" charset="0"/>
                             </a:rPr>
-                            <m:t>J</m:t>
+                            <m:t>𝐓</m:t>
                           </m:r>
                         </m:e>
                         <m:sub>
@@ -26622,7 +26716,7 @@
                       <m:sSub>
                         <m:sSubPr>
                           <m:ctrlPr>
-                            <a:rPr lang="en-US" altLang="ja-JP" sz="2800" b="1" i="1">
+                            <a:rPr lang="en-US" altLang="ja-JP" sz="2800" b="1" i="1" smtClean="0">
                               <a:solidFill>
                                 <a:srgbClr val="212733"/>
                               </a:solidFill>
@@ -26636,14 +26730,14 @@
                             <m:rPr>
                               <m:nor/>
                             </m:rPr>
-                            <a:rPr lang="en-US" altLang="ja-JP" sz="2800" b="1">
+                            <a:rPr lang="en-US" altLang="ja-JP" sz="2800" b="1" i="0" smtClean="0">
                               <a:solidFill>
                                 <a:srgbClr val="212733"/>
                               </a:solidFill>
                               <a:latin typeface="Cambria Math" panose="02040503050406030204" pitchFamily="18" charset="0"/>
                               <a:cs typeface="Arial" panose="020B0604020202020204" pitchFamily="34" charset="0"/>
                             </a:rPr>
-                            <m:t>J</m:t>
+                            <m:t>T</m:t>
                           </m:r>
                         </m:e>
                         <m:sub>
@@ -26677,14 +26771,14 @@
                             <m:rPr>
                               <m:nor/>
                             </m:rPr>
-                            <a:rPr lang="en-US" altLang="ja-JP" sz="2800" b="1">
+                            <a:rPr lang="en-US" altLang="ja-JP" sz="2800" b="1" i="0" smtClean="0">
                               <a:solidFill>
                                 <a:srgbClr val="212733"/>
                               </a:solidFill>
                               <a:latin typeface="Cambria Math" panose="02040503050406030204" pitchFamily="18" charset="0"/>
                               <a:cs typeface="Arial" panose="020B0604020202020204" pitchFamily="34" charset="0"/>
                             </a:rPr>
-                            <m:t>J</m:t>
+                            <m:t>T</m:t>
                           </m:r>
                         </m:e>
                         <m:sub>
@@ -26733,8 +26827,8 @@
             </p:nvSpPr>
             <p:spPr>
               <a:xfrm>
-                <a:off x="1429241" y="812693"/>
-                <a:ext cx="1890133" cy="465384"/>
+                <a:off x="1291575" y="812693"/>
+                <a:ext cx="2165465" cy="465384"/>
               </a:xfrm>
               <a:prstGeom prst="rect">
                 <a:avLst/>
@@ -26911,8 +27005,8 @@
             </p:nvSpPr>
             <p:spPr>
               <a:xfrm>
-                <a:off x="9887918" y="1817259"/>
-                <a:ext cx="331373" cy="398955"/>
+                <a:off x="9868394" y="1817259"/>
+                <a:ext cx="370421" cy="398955"/>
               </a:xfrm>
               <a:prstGeom prst="rect">
                 <a:avLst/>
@@ -26950,14 +27044,14 @@
                             <m:rPr>
                               <m:nor/>
                             </m:rPr>
-                            <a:rPr lang="en-US" altLang="ja-JP" sz="2400" b="1">
+                            <a:rPr lang="en-US" altLang="ja-JP" sz="2400" b="1" i="0" smtClean="0">
                               <a:solidFill>
                                 <a:srgbClr val="212733"/>
                               </a:solidFill>
                               <a:latin typeface="Cambria Math" panose="02040503050406030204" pitchFamily="18" charset="0"/>
                               <a:cs typeface="Arial" panose="020B0604020202020204" pitchFamily="34" charset="0"/>
                             </a:rPr>
-                            <m:t>J</m:t>
+                            <m:t>T</m:t>
                           </m:r>
                         </m:e>
                         <m:sub>
@@ -27006,8 +27100,8 @@
             </p:nvSpPr>
             <p:spPr>
               <a:xfrm>
-                <a:off x="9887918" y="1817259"/>
-                <a:ext cx="331373" cy="398955"/>
+                <a:off x="9868394" y="1817259"/>
+                <a:ext cx="370421" cy="398955"/>
               </a:xfrm>
               <a:prstGeom prst="rect">
                 <a:avLst/>
@@ -27015,7 +27109,7 @@
               <a:blipFill>
                 <a:blip r:embed="rId3"/>
                 <a:stretch>
-                  <a:fillRect l="-40741" r="-1852" b="-25758"/>
+                  <a:fillRect l="-29508" b="-25758"/>
                 </a:stretch>
               </a:blipFill>
             </p:spPr>
@@ -27050,8 +27144,8 @@
             </p:nvSpPr>
             <p:spPr>
               <a:xfrm>
-                <a:off x="9887917" y="2875330"/>
-                <a:ext cx="331373" cy="369332"/>
+                <a:off x="9859063" y="2875330"/>
+                <a:ext cx="389081" cy="369332"/>
               </a:xfrm>
               <a:prstGeom prst="rect">
                 <a:avLst/>
@@ -27089,14 +27183,15 @@
                             <m:rPr>
                               <m:nor/>
                             </m:rPr>
-                            <a:rPr lang="en-US" altLang="ja-JP" sz="2400" b="1">
+                            <a:rPr kumimoji="1" lang="en-US" altLang="ja-JP" sz="2400" b="1" i="0" smtClean="0">
                               <a:solidFill>
                                 <a:srgbClr val="212733"/>
                               </a:solidFill>
                               <a:latin typeface="Cambria Math" panose="02040503050406030204" pitchFamily="18" charset="0"/>
+                              <a:ea typeface="+mn-ea"/>
                               <a:cs typeface="Arial" panose="020B0604020202020204" pitchFamily="34" charset="0"/>
                             </a:rPr>
-                            <m:t>J</m:t>
+                            <m:t>T</m:t>
                           </m:r>
                         </m:e>
                         <m:sub>
@@ -27145,8 +27240,8 @@
             </p:nvSpPr>
             <p:spPr>
               <a:xfrm>
-                <a:off x="9887917" y="2875330"/>
-                <a:ext cx="331373" cy="369332"/>
+                <a:off x="9859063" y="2875330"/>
+                <a:ext cx="389081" cy="369332"/>
               </a:xfrm>
               <a:prstGeom prst="rect">
                 <a:avLst/>
@@ -27154,7 +27249,7 @@
               <a:blipFill>
                 <a:blip r:embed="rId4"/>
                 <a:stretch>
-                  <a:fillRect l="-40741" b="-35000"/>
+                  <a:fillRect l="-26563" b="-20000"/>
                 </a:stretch>
               </a:blipFill>
             </p:spPr>
@@ -27189,8 +27284,8 @@
             </p:nvSpPr>
             <p:spPr>
               <a:xfrm>
-                <a:off x="11020062" y="2313159"/>
-                <a:ext cx="316433" cy="369332"/>
+                <a:off x="10991208" y="2313159"/>
+                <a:ext cx="374141" cy="369332"/>
               </a:xfrm>
               <a:prstGeom prst="rect">
                 <a:avLst/>
@@ -27228,14 +27323,15 @@
                             <m:rPr>
                               <m:nor/>
                             </m:rPr>
-                            <a:rPr lang="en-US" altLang="ja-JP" sz="2400" b="1">
+                            <a:rPr kumimoji="1" lang="en-US" altLang="ja-JP" sz="2400" b="1" i="0" smtClean="0">
                               <a:solidFill>
                                 <a:srgbClr val="212733"/>
                               </a:solidFill>
                               <a:latin typeface="Cambria Math" panose="02040503050406030204" pitchFamily="18" charset="0"/>
+                              <a:ea typeface="+mn-ea"/>
                               <a:cs typeface="Arial" panose="020B0604020202020204" pitchFamily="34" charset="0"/>
                             </a:rPr>
-                            <m:t>J</m:t>
+                            <m:t>T</m:t>
                           </m:r>
                         </m:e>
                         <m:sub>
@@ -27284,8 +27380,8 @@
             </p:nvSpPr>
             <p:spPr>
               <a:xfrm>
-                <a:off x="11020062" y="2313159"/>
-                <a:ext cx="316433" cy="369332"/>
+                <a:off x="10991208" y="2313159"/>
+                <a:ext cx="374141" cy="369332"/>
               </a:xfrm>
               <a:prstGeom prst="rect">
                 <a:avLst/>
@@ -27293,7 +27389,7 @@
               <a:blipFill>
                 <a:blip r:embed="rId5"/>
                 <a:stretch>
-                  <a:fillRect l="-44231" b="-34426"/>
+                  <a:fillRect l="-27869" b="-13115"/>
                 </a:stretch>
               </a:blipFill>
             </p:spPr>
@@ -27328,8 +27424,8 @@
             </p:nvSpPr>
             <p:spPr>
               <a:xfrm>
-                <a:off x="2167727" y="1417272"/>
-                <a:ext cx="3297569" cy="615810"/>
+                <a:off x="2047951" y="1417272"/>
+                <a:ext cx="3537122" cy="615810"/>
               </a:xfrm>
               <a:prstGeom prst="rect">
                 <a:avLst/>
@@ -27374,7 +27470,7 @@
                               <a:latin typeface="Cambria Math" panose="02040503050406030204" pitchFamily="18" charset="0"/>
                               <a:cs typeface="Arial" panose="020B0604020202020204" pitchFamily="34" charset="0"/>
                             </a:rPr>
-                            <m:t>J</m:t>
+                            <m:t>T</m:t>
                           </m:r>
                         </m:e>
                         <m:sub>
@@ -27527,7 +27623,7 @@
                               <a:ea typeface="+mn-ea"/>
                               <a:cs typeface="Arial" panose="020B0604020202020204" pitchFamily="34" charset="0"/>
                             </a:rPr>
-                            <m:t>J</m:t>
+                            <m:t>T</m:t>
                           </m:r>
                         </m:e>
                         <m:sub>
@@ -27682,8 +27778,8 @@
             </p:nvSpPr>
             <p:spPr>
               <a:xfrm>
-                <a:off x="2167727" y="1417272"/>
-                <a:ext cx="3297569" cy="615810"/>
+                <a:off x="2047951" y="1417272"/>
+                <a:ext cx="3537122" cy="615810"/>
               </a:xfrm>
               <a:prstGeom prst="rect">
                 <a:avLst/>
@@ -27726,8 +27822,8 @@
             </p:nvSpPr>
             <p:spPr>
               <a:xfrm>
-                <a:off x="2837940" y="4364357"/>
-                <a:ext cx="2048574" cy="615810"/>
+                <a:off x="2809086" y="4364357"/>
+                <a:ext cx="2106282" cy="615810"/>
               </a:xfrm>
               <a:prstGeom prst="rect">
                 <a:avLst/>
@@ -27765,14 +27861,15 @@
                             <m:rPr>
                               <m:nor/>
                             </m:rPr>
-                            <a:rPr lang="en-US" altLang="ja-JP" sz="2400" b="1" i="0" smtClean="0">
+                            <a:rPr kumimoji="1" lang="en-US" altLang="ja-JP" sz="2400" b="1" i="0" smtClean="0">
                               <a:solidFill>
                                 <a:srgbClr val="212733"/>
                               </a:solidFill>
                               <a:latin typeface="Cambria Math" panose="02040503050406030204" pitchFamily="18" charset="0"/>
+                              <a:ea typeface="+mn-ea"/>
                               <a:cs typeface="Arial" panose="020B0604020202020204" pitchFamily="34" charset="0"/>
                             </a:rPr>
-                            <m:t>J</m:t>
+                            <m:t>T</m:t>
                           </m:r>
                         </m:e>
                         <m:sub>
@@ -27942,8 +28039,8 @@
             </p:nvSpPr>
             <p:spPr>
               <a:xfrm>
-                <a:off x="2837940" y="4364357"/>
-                <a:ext cx="2048574" cy="615810"/>
+                <a:off x="2809086" y="4364357"/>
+                <a:ext cx="2106282" cy="615810"/>
               </a:xfrm>
               <a:prstGeom prst="rect">
                 <a:avLst/>
@@ -28102,8 +28199,8 @@
             </p:nvSpPr>
             <p:spPr>
               <a:xfrm>
-                <a:off x="2849214" y="2532923"/>
-                <a:ext cx="2074158" cy="615810"/>
+                <a:off x="2820360" y="2532923"/>
+                <a:ext cx="2131866" cy="615810"/>
               </a:xfrm>
               <a:prstGeom prst="rect">
                 <a:avLst/>
@@ -28148,7 +28245,7 @@
                               <a:latin typeface="Cambria Math" panose="02040503050406030204" pitchFamily="18" charset="0"/>
                               <a:cs typeface="Arial" panose="020B0604020202020204" pitchFamily="34" charset="0"/>
                             </a:rPr>
-                            <m:t>J</m:t>
+                            <m:t>T</m:t>
                           </m:r>
                         </m:e>
                         <m:sub>
@@ -28318,8 +28415,8 @@
             </p:nvSpPr>
             <p:spPr>
               <a:xfrm>
-                <a:off x="2849214" y="2532923"/>
-                <a:ext cx="2074158" cy="615810"/>
+                <a:off x="2820360" y="2532923"/>
+                <a:ext cx="2131866" cy="615810"/>
               </a:xfrm>
               <a:prstGeom prst="rect">
                 <a:avLst/>
@@ -28412,8 +28509,8 @@
             </p:nvSpPr>
             <p:spPr>
               <a:xfrm>
-                <a:off x="1426661" y="5184482"/>
-                <a:ext cx="5718617" cy="1436932"/>
+                <a:off x="1240649" y="5184482"/>
+                <a:ext cx="6090642" cy="1436932"/>
               </a:xfrm>
               <a:prstGeom prst="rect">
                 <a:avLst/>
@@ -28459,7 +28556,7 @@
                               <a:ea typeface="+mn-ea"/>
                               <a:cs typeface="Arial" panose="020B0604020202020204" pitchFamily="34" charset="0"/>
                             </a:rPr>
-                            <m:t>J</m:t>
+                            <m:t>T</m:t>
                           </m:r>
                         </m:e>
                         <m:sub>
@@ -28597,14 +28694,14 @@
                             <m:rPr>
                               <m:nor/>
                             </m:rPr>
-                            <a:rPr lang="en-US" altLang="ja-JP" sz="2800" b="1">
+                            <a:rPr lang="en-US" altLang="ja-JP" sz="2800" b="1" i="0" smtClean="0">
                               <a:solidFill>
                                 <a:srgbClr val="212733"/>
                               </a:solidFill>
                               <a:latin typeface="Cambria Math" panose="02040503050406030204" pitchFamily="18" charset="0"/>
                               <a:cs typeface="Arial" panose="020B0604020202020204" pitchFamily="34" charset="0"/>
                             </a:rPr>
-                            <m:t>J</m:t>
+                            <m:t>T</m:t>
                           </m:r>
                         </m:e>
                         <m:sub>
@@ -28836,14 +28933,15 @@
                             <m:rPr>
                               <m:nor/>
                             </m:rPr>
-                            <a:rPr lang="en-US" altLang="ja-JP" sz="2800" b="1">
+                            <a:rPr kumimoji="1" lang="en-US" altLang="ja-JP" sz="2800" b="1" i="0" smtClean="0">
                               <a:solidFill>
                                 <a:srgbClr val="212733"/>
                               </a:solidFill>
                               <a:latin typeface="Cambria Math" panose="02040503050406030204" pitchFamily="18" charset="0"/>
+                              <a:ea typeface="+mn-ea"/>
                               <a:cs typeface="Arial" panose="020B0604020202020204" pitchFamily="34" charset="0"/>
                             </a:rPr>
-                            <m:t>J</m:t>
+                            <m:t>T</m:t>
                           </m:r>
                         </m:e>
                         <m:sub>
@@ -29006,14 +29104,14 @@
                           <m:rPr>
                             <m:nor/>
                           </m:rPr>
-                          <a:rPr lang="en-US" altLang="ja-JP" sz="2800" b="1">
+                          <a:rPr lang="en-US" altLang="ja-JP" sz="2800" b="1" i="0" smtClean="0">
                             <a:solidFill>
                               <a:srgbClr val="212733"/>
                             </a:solidFill>
                             <a:latin typeface="Cambria Math" panose="02040503050406030204" pitchFamily="18" charset="0"/>
                             <a:cs typeface="Arial" panose="020B0604020202020204" pitchFamily="34" charset="0"/>
                           </a:rPr>
-                          <m:t>J</m:t>
+                          <m:t>T</m:t>
                         </m:r>
                       </m:e>
                       <m:sub>
@@ -29059,14 +29157,15 @@
                           <m:rPr>
                             <m:nor/>
                           </m:rPr>
-                          <a:rPr lang="en-US" altLang="ja-JP" sz="2800" b="1">
+                          <a:rPr kumimoji="1" lang="en-US" altLang="ja-JP" sz="2800" b="1" i="0" smtClean="0">
                             <a:solidFill>
                               <a:srgbClr val="212733"/>
                             </a:solidFill>
                             <a:latin typeface="Cambria Math" panose="02040503050406030204" pitchFamily="18" charset="0"/>
+                            <a:ea typeface="+mn-ea"/>
                             <a:cs typeface="Arial" panose="020B0604020202020204" pitchFamily="34" charset="0"/>
                           </a:rPr>
-                          <m:t>J</m:t>
+                          <m:t>T</m:t>
                         </m:r>
                       </m:e>
                       <m:sub>
@@ -29114,8 +29213,8 @@
             </p:nvSpPr>
             <p:spPr>
               <a:xfrm>
-                <a:off x="1426661" y="5184482"/>
-                <a:ext cx="5718617" cy="1436932"/>
+                <a:off x="1240649" y="5184482"/>
+                <a:ext cx="6090642" cy="1436932"/>
               </a:xfrm>
               <a:prstGeom prst="rect">
                 <a:avLst/>
@@ -29142,6 +29241,635 @@
           </p:sp>
         </mc:Fallback>
       </mc:AlternateContent>
+      <mc:AlternateContent xmlns:mc="http://schemas.openxmlformats.org/markup-compatibility/2006">
+        <mc:Choice xmlns:a14="http://schemas.microsoft.com/office/drawing/2010/main" Requires="a14">
+          <p:sp>
+            <p:nvSpPr>
+              <p:cNvPr id="20" name="TextBox 19">
+                <a:extLst>
+                  <a:ext uri="{FF2B5EF4-FFF2-40B4-BE49-F238E27FC236}">
+                    <a16:creationId xmlns:a16="http://schemas.microsoft.com/office/drawing/2014/main" id="{A461DD8A-C962-4394-B990-F3AEDBF40269}"/>
+                  </a:ext>
+                </a:extLst>
+              </p:cNvPr>
+              <p:cNvSpPr txBox="1"/>
+              <p:nvPr/>
+            </p:nvSpPr>
+            <p:spPr>
+              <a:xfrm>
+                <a:off x="7331291" y="5135283"/>
+                <a:ext cx="4770024" cy="1497076"/>
+              </a:xfrm>
+              <a:prstGeom prst="rect">
+                <a:avLst/>
+              </a:prstGeom>
+              <a:noFill/>
+            </p:spPr>
+            <p:txBody>
+              <a:bodyPr wrap="none" lIns="0" tIns="0" rIns="0" bIns="0" rtlCol="0">
+                <a:spAutoFit/>
+              </a:bodyPr>
+              <a:lstStyle/>
+              <a:p>
+                <a:pPr/>
+                <a14:m>
+                  <m:oMath xmlns:m="http://schemas.openxmlformats.org/officeDocument/2006/math">
+                    <m:sSub>
+                      <m:sSubPr>
+                        <m:ctrlPr>
+                          <a:rPr kumimoji="1" lang="en-US" altLang="ja-JP" sz="1600" b="1" i="1" smtClean="0">
+                            <a:solidFill>
+                              <a:srgbClr val="212733"/>
+                            </a:solidFill>
+                            <a:latin typeface="Cambria Math" panose="02040503050406030204" pitchFamily="18" charset="0"/>
+                            <a:ea typeface="+mn-ea"/>
+                            <a:cs typeface="Arial" panose="020B0604020202020204" pitchFamily="34" charset="0"/>
+                          </a:rPr>
+                        </m:ctrlPr>
+                      </m:sSubPr>
+                      <m:e>
+                        <m:r>
+                          <m:rPr>
+                            <m:nor/>
+                          </m:rPr>
+                          <a:rPr kumimoji="1" lang="en-US" altLang="ja-JP" sz="1600" b="1" i="0" smtClean="0">
+                            <a:solidFill>
+                              <a:srgbClr val="212733"/>
+                            </a:solidFill>
+                            <a:latin typeface="Cambria Math" panose="02040503050406030204" pitchFamily="18" charset="0"/>
+                            <a:ea typeface="+mn-ea"/>
+                            <a:cs typeface="Arial" panose="020B0604020202020204" pitchFamily="34" charset="0"/>
+                          </a:rPr>
+                          <m:t>T</m:t>
+                        </m:r>
+                      </m:e>
+                      <m:sub>
+                        <m:r>
+                          <a:rPr kumimoji="1" lang="en-US" altLang="ja-JP" sz="1600" b="0" i="1" smtClean="0">
+                            <a:solidFill>
+                              <a:srgbClr val="212733"/>
+                            </a:solidFill>
+                            <a:latin typeface="Cambria Math" panose="02040503050406030204" pitchFamily="18" charset="0"/>
+                            <a:ea typeface="+mn-ea"/>
+                            <a:cs typeface="Arial" panose="020B0604020202020204" pitchFamily="34" charset="0"/>
+                          </a:rPr>
+                          <m:t>𝑎𝑙𝑙</m:t>
+                        </m:r>
+                      </m:sub>
+                    </m:sSub>
+                  </m:oMath>
+                </a14:m>
+                <a:r>
+                  <a:rPr kumimoji="1" lang="en-US" altLang="ja-JP" sz="1600" dirty="0">
+                    <a:solidFill>
+                      <a:srgbClr val="212733"/>
+                    </a:solidFill>
+                    <a:latin typeface="Cambria Math" panose="02040503050406030204" pitchFamily="18" charset="0"/>
+                    <a:ea typeface="+mn-ea"/>
+                    <a:cs typeface="Arial" panose="020B0604020202020204" pitchFamily="34" charset="0"/>
+                  </a:rPr>
+                  <a:t>:Transfer matrix of entire system</a:t>
+                </a:r>
+              </a:p>
+              <a:p>
+                <a14:m>
+                  <m:oMath xmlns:m="http://schemas.openxmlformats.org/officeDocument/2006/math">
+                    <m:sSub>
+                      <m:sSubPr>
+                        <m:ctrlPr>
+                          <a:rPr kumimoji="1" lang="en-US" altLang="ja-JP" sz="1600" i="1" smtClean="0">
+                            <a:solidFill>
+                              <a:srgbClr val="212733"/>
+                            </a:solidFill>
+                            <a:latin typeface="Cambria Math" panose="02040503050406030204" pitchFamily="18" charset="0"/>
+                            <a:ea typeface="+mn-ea"/>
+                            <a:cs typeface="Arial" panose="020B0604020202020204" pitchFamily="34" charset="0"/>
+                          </a:rPr>
+                        </m:ctrlPr>
+                      </m:sSubPr>
+                      <m:e>
+                        <m:r>
+                          <m:rPr>
+                            <m:nor/>
+                          </m:rPr>
+                          <a:rPr lang="en-US" altLang="ja-JP" sz="1600" b="1" i="0" smtClean="0">
+                            <a:solidFill>
+                              <a:srgbClr val="212733"/>
+                            </a:solidFill>
+                            <a:latin typeface="Cambria Math" panose="02040503050406030204" pitchFamily="18" charset="0"/>
+                            <a:cs typeface="Arial" panose="020B0604020202020204" pitchFamily="34" charset="0"/>
+                          </a:rPr>
+                          <m:t>T</m:t>
+                        </m:r>
+                      </m:e>
+                      <m:sub>
+                        <m:r>
+                          <a:rPr kumimoji="1" lang="en-US" altLang="ja-JP" sz="1600" b="0" i="1" smtClean="0">
+                            <a:solidFill>
+                              <a:srgbClr val="212733"/>
+                            </a:solidFill>
+                            <a:latin typeface="Cambria Math" panose="02040503050406030204" pitchFamily="18" charset="0"/>
+                            <a:ea typeface="+mn-ea"/>
+                            <a:cs typeface="Arial" panose="020B0604020202020204" pitchFamily="34" charset="0"/>
+                          </a:rPr>
+                          <m:t>𝑓</m:t>
+                        </m:r>
+                      </m:sub>
+                    </m:sSub>
+                  </m:oMath>
+                </a14:m>
+                <a:r>
+                  <a:rPr lang="en-US" altLang="ja-JP" sz="1600" dirty="0">
+                    <a:solidFill>
+                      <a:srgbClr val="212733"/>
+                    </a:solidFill>
+                    <a:latin typeface="Cambria Math" panose="02040503050406030204" pitchFamily="18" charset="0"/>
+                    <a:cs typeface="Arial" panose="020B0604020202020204" pitchFamily="34" charset="0"/>
+                  </a:rPr>
+                  <a:t>:   Transfer matrix of forward propagation</a:t>
+                </a:r>
+              </a:p>
+              <a:p>
+                <a:pPr/>
+                <a14:m>
+                  <m:oMath xmlns:m="http://schemas.openxmlformats.org/officeDocument/2006/math">
+                    <m:sSub>
+                      <m:sSubPr>
+                        <m:ctrlPr>
+                          <a:rPr lang="en-US" altLang="ja-JP" sz="1600" b="1" i="1">
+                            <a:solidFill>
+                              <a:srgbClr val="212733"/>
+                            </a:solidFill>
+                            <a:latin typeface="Cambria Math" panose="02040503050406030204" pitchFamily="18" charset="0"/>
+                            <a:cs typeface="Arial" panose="020B0604020202020204" pitchFamily="34" charset="0"/>
+                          </a:rPr>
+                        </m:ctrlPr>
+                      </m:sSubPr>
+                      <m:e>
+                        <m:r>
+                          <a:rPr lang="en-US" altLang="ja-JP" sz="1600" b="1" i="0" smtClean="0">
+                            <a:solidFill>
+                              <a:srgbClr val="212733"/>
+                            </a:solidFill>
+                            <a:latin typeface="Cambria Math" panose="02040503050406030204" pitchFamily="18" charset="0"/>
+                            <a:cs typeface="Arial" panose="020B0604020202020204" pitchFamily="34" charset="0"/>
+                          </a:rPr>
+                          <m:t>𝐓</m:t>
+                        </m:r>
+                      </m:e>
+                      <m:sub>
+                        <m:r>
+                          <a:rPr lang="en-US" altLang="ja-JP" sz="1600" i="1">
+                            <a:solidFill>
+                              <a:srgbClr val="212733"/>
+                            </a:solidFill>
+                            <a:latin typeface="Cambria Math" panose="02040503050406030204" pitchFamily="18" charset="0"/>
+                            <a:cs typeface="Arial" panose="020B0604020202020204" pitchFamily="34" charset="0"/>
+                          </a:rPr>
+                          <m:t>𝑏</m:t>
+                        </m:r>
+                      </m:sub>
+                    </m:sSub>
+                  </m:oMath>
+                </a14:m>
+                <a:r>
+                  <a:rPr lang="en-US" altLang="ja-JP" sz="1600" b="1" i="1" dirty="0">
+                    <a:solidFill>
+                      <a:srgbClr val="212733"/>
+                    </a:solidFill>
+                    <a:latin typeface="Cambria Math" panose="02040503050406030204" pitchFamily="18" charset="0"/>
+                    <a:cs typeface="Arial" panose="020B0604020202020204" pitchFamily="34" charset="0"/>
+                  </a:rPr>
+                  <a:t>:</a:t>
+                </a:r>
+                <a:r>
+                  <a:rPr lang="en-US" altLang="ja-JP" sz="1600" dirty="0">
+                    <a:solidFill>
+                      <a:srgbClr val="212733"/>
+                    </a:solidFill>
+                    <a:latin typeface="Cambria Math" panose="02040503050406030204" pitchFamily="18" charset="0"/>
+                    <a:cs typeface="Arial" panose="020B0604020202020204" pitchFamily="34" charset="0"/>
+                  </a:rPr>
+                  <a:t>  Transfer matrix of backward propagation</a:t>
+                </a:r>
+                <a:endParaRPr lang="en-US" altLang="ja-JP" sz="1600" b="1" i="1" dirty="0">
+                  <a:solidFill>
+                    <a:srgbClr val="212733"/>
+                  </a:solidFill>
+                  <a:latin typeface="Cambria Math" panose="02040503050406030204" pitchFamily="18" charset="0"/>
+                  <a:cs typeface="Arial" panose="020B0604020202020204" pitchFamily="34" charset="0"/>
+                </a:endParaRPr>
+              </a:p>
+              <a:p>
+                <a:pPr/>
+                <a14:m>
+                  <m:oMath xmlns:m="http://schemas.openxmlformats.org/officeDocument/2006/math">
+                    <m:sSub>
+                      <m:sSubPr>
+                        <m:ctrlPr>
+                          <a:rPr lang="en-US" altLang="ja-JP" sz="1600" b="1" i="1" smtClean="0">
+                            <a:solidFill>
+                              <a:srgbClr val="212733"/>
+                            </a:solidFill>
+                            <a:latin typeface="Cambria Math" panose="02040503050406030204" pitchFamily="18" charset="0"/>
+                            <a:cs typeface="Arial" panose="020B0604020202020204" pitchFamily="34" charset="0"/>
+                          </a:rPr>
+                        </m:ctrlPr>
+                      </m:sSubPr>
+                      <m:e>
+                        <m:r>
+                          <m:rPr>
+                            <m:nor/>
+                          </m:rPr>
+                          <a:rPr lang="en-US" altLang="ja-JP" sz="1600" b="1" i="0" smtClean="0">
+                            <a:solidFill>
+                              <a:srgbClr val="212733"/>
+                            </a:solidFill>
+                            <a:latin typeface="Cambria Math" panose="02040503050406030204" pitchFamily="18" charset="0"/>
+                            <a:cs typeface="Arial" panose="020B0604020202020204" pitchFamily="34" charset="0"/>
+                          </a:rPr>
+                          <m:t>T</m:t>
+                        </m:r>
+                      </m:e>
+                      <m:sub>
+                        <m:r>
+                          <a:rPr lang="en-US" altLang="ja-JP" sz="1600" b="0" i="1" smtClean="0">
+                            <a:solidFill>
+                              <a:srgbClr val="212733"/>
+                            </a:solidFill>
+                            <a:latin typeface="Cambria Math" panose="02040503050406030204" pitchFamily="18" charset="0"/>
+                            <a:cs typeface="Arial" panose="020B0604020202020204" pitchFamily="34" charset="0"/>
+                          </a:rPr>
+                          <m:t>𝑟</m:t>
+                        </m:r>
+                      </m:sub>
+                    </m:sSub>
+                  </m:oMath>
+                </a14:m>
+                <a:r>
+                  <a:rPr lang="en-US" altLang="ja-JP" sz="1600" dirty="0">
+                    <a:solidFill>
+                      <a:srgbClr val="212733"/>
+                    </a:solidFill>
+                    <a:latin typeface="Cambria Math" panose="02040503050406030204" pitchFamily="18" charset="0"/>
+                    <a:cs typeface="Arial" panose="020B0604020202020204" pitchFamily="34" charset="0"/>
+                  </a:rPr>
+                  <a:t>:   Transfer matrix of reverting propagation direction</a:t>
+                </a:r>
+              </a:p>
+              <a:p>
+                <a:pPr/>
+                <a:r>
+                  <a:rPr lang="en-US" altLang="ja-JP" sz="1600" i="1" dirty="0">
+                    <a:solidFill>
+                      <a:srgbClr val="212733"/>
+                    </a:solidFill>
+                    <a:latin typeface="Cambria Math" panose="02040503050406030204" pitchFamily="18" charset="0"/>
+                    <a:cs typeface="Arial" panose="020B0604020202020204" pitchFamily="34" charset="0"/>
+                  </a:rPr>
+                  <a:t>R</a:t>
+                </a:r>
+                <a:r>
+                  <a:rPr lang="en-US" altLang="ja-JP" sz="1600" dirty="0">
+                    <a:solidFill>
+                      <a:srgbClr val="212733"/>
+                    </a:solidFill>
+                    <a:latin typeface="Cambria Math" panose="02040503050406030204" pitchFamily="18" charset="0"/>
+                    <a:cs typeface="Arial" panose="020B0604020202020204" pitchFamily="34" charset="0"/>
+                  </a:rPr>
+                  <a:t>:    Reflection coefficient</a:t>
+                </a:r>
+              </a:p>
+              <a:p>
+                <a:pPr/>
+                <a:r>
+                  <a:rPr lang="en-US" altLang="ja-JP" sz="1600" i="1" dirty="0">
+                    <a:solidFill>
+                      <a:srgbClr val="212733"/>
+                    </a:solidFill>
+                    <a:latin typeface="Cambria Math" panose="02040503050406030204" pitchFamily="18" charset="0"/>
+                    <a:cs typeface="Arial" panose="020B0604020202020204" pitchFamily="34" charset="0"/>
+                  </a:rPr>
+                  <a:t>a</a:t>
+                </a:r>
+                <a:r>
+                  <a:rPr lang="en-US" altLang="ja-JP" sz="1600" dirty="0">
+                    <a:solidFill>
+                      <a:srgbClr val="212733"/>
+                    </a:solidFill>
+                    <a:latin typeface="Cambria Math" panose="02040503050406030204" pitchFamily="18" charset="0"/>
+                    <a:cs typeface="Arial" panose="020B0604020202020204" pitchFamily="34" charset="0"/>
+                  </a:rPr>
+                  <a:t>:     Backscattering coefficient</a:t>
+                </a:r>
+                <a:endParaRPr lang="en-US" altLang="ja-JP" sz="1600" i="1" dirty="0">
+                  <a:solidFill>
+                    <a:srgbClr val="212733"/>
+                  </a:solidFill>
+                  <a:latin typeface="Cambria Math" panose="02040503050406030204" pitchFamily="18" charset="0"/>
+                  <a:cs typeface="Arial" panose="020B0604020202020204" pitchFamily="34" charset="0"/>
+                </a:endParaRPr>
+              </a:p>
+            </p:txBody>
+          </p:sp>
+        </mc:Choice>
+        <mc:Fallback>
+          <p:sp>
+            <p:nvSpPr>
+              <p:cNvPr id="20" name="TextBox 19">
+                <a:extLst>
+                  <a:ext uri="{FF2B5EF4-FFF2-40B4-BE49-F238E27FC236}">
+                    <a16:creationId xmlns:a16="http://schemas.microsoft.com/office/drawing/2014/main" id="{A461DD8A-C962-4394-B990-F3AEDBF40269}"/>
+                  </a:ext>
+                </a:extLst>
+              </p:cNvPr>
+              <p:cNvSpPr txBox="1">
+                <a:spLocks noRot="1" noChangeAspect="1" noMove="1" noResize="1" noEditPoints="1" noAdjustHandles="1" noChangeArrowheads="1" noChangeShapeType="1" noTextEdit="1"/>
+              </p:cNvSpPr>
+              <p:nvPr/>
+            </p:nvSpPr>
+            <p:spPr>
+              <a:xfrm>
+                <a:off x="7331291" y="5135283"/>
+                <a:ext cx="4770024" cy="1497076"/>
+              </a:xfrm>
+              <a:prstGeom prst="rect">
+                <a:avLst/>
+              </a:prstGeom>
+              <a:blipFill>
+                <a:blip r:embed="rId10"/>
+                <a:stretch>
+                  <a:fillRect l="-2685" t="-4472" r="-1535" b="-7317"/>
+                </a:stretch>
+              </a:blipFill>
+            </p:spPr>
+            <p:txBody>
+              <a:bodyPr/>
+              <a:lstStyle/>
+              <a:p>
+                <a:r>
+                  <a:rPr lang="ja-JP" altLang="en-US">
+                    <a:noFill/>
+                  </a:rPr>
+                  <a:t> </a:t>
+                </a:r>
+              </a:p>
+            </p:txBody>
+          </p:sp>
+        </mc:Fallback>
+      </mc:AlternateContent>
+      <p:grpSp>
+        <p:nvGrpSpPr>
+          <p:cNvPr id="26" name="Group 25">
+            <a:extLst>
+              <a:ext uri="{FF2B5EF4-FFF2-40B4-BE49-F238E27FC236}">
+                <a16:creationId xmlns:a16="http://schemas.microsoft.com/office/drawing/2014/main" id="{29154CEB-B20C-45B5-80B5-335FAD1B1DE8}"/>
+              </a:ext>
+            </a:extLst>
+          </p:cNvPr>
+          <p:cNvGrpSpPr/>
+          <p:nvPr/>
+        </p:nvGrpSpPr>
+        <p:grpSpPr>
+          <a:xfrm>
+            <a:off x="9171038" y="1929284"/>
+            <a:ext cx="425138" cy="585262"/>
+            <a:chOff x="7889768" y="2242357"/>
+            <a:chExt cx="425138" cy="585262"/>
+          </a:xfrm>
+        </p:grpSpPr>
+        <p:cxnSp>
+          <p:nvCxnSpPr>
+            <p:cNvPr id="27" name="Straight Arrow Connector 26">
+              <a:extLst>
+                <a:ext uri="{FF2B5EF4-FFF2-40B4-BE49-F238E27FC236}">
+                  <a16:creationId xmlns:a16="http://schemas.microsoft.com/office/drawing/2014/main" id="{8A0326F5-2EAB-402E-8641-1539562BEF42}"/>
+                </a:ext>
+              </a:extLst>
+            </p:cNvPr>
+            <p:cNvCxnSpPr>
+              <a:cxnSpLocks/>
+            </p:cNvCxnSpPr>
+            <p:nvPr/>
+          </p:nvCxnSpPr>
+          <p:spPr bwMode="auto">
+            <a:xfrm>
+              <a:off x="7889768" y="2618541"/>
+              <a:ext cx="425138" cy="0"/>
+            </a:xfrm>
+            <a:prstGeom prst="straightConnector1">
+              <a:avLst/>
+            </a:prstGeom>
+            <a:noFill/>
+            <a:ln w="12700" cap="flat" cmpd="sng" algn="ctr">
+              <a:solidFill>
+                <a:srgbClr val="212733"/>
+              </a:solidFill>
+              <a:prstDash val="solid"/>
+              <a:round/>
+              <a:headEnd type="none" w="med" len="med"/>
+              <a:tailEnd type="triangle"/>
+            </a:ln>
+            <a:effectLst/>
+          </p:spPr>
+        </p:cxnSp>
+        <p:cxnSp>
+          <p:nvCxnSpPr>
+            <p:cNvPr id="28" name="Straight Arrow Connector 27">
+              <a:extLst>
+                <a:ext uri="{FF2B5EF4-FFF2-40B4-BE49-F238E27FC236}">
+                  <a16:creationId xmlns:a16="http://schemas.microsoft.com/office/drawing/2014/main" id="{B0043CC2-4781-40E7-8AAD-73743EA2801F}"/>
+                </a:ext>
+              </a:extLst>
+            </p:cNvPr>
+            <p:cNvCxnSpPr>
+              <a:cxnSpLocks/>
+            </p:cNvCxnSpPr>
+            <p:nvPr/>
+          </p:nvCxnSpPr>
+          <p:spPr bwMode="auto">
+            <a:xfrm>
+              <a:off x="7889768" y="2618541"/>
+              <a:ext cx="209078" cy="209078"/>
+            </a:xfrm>
+            <a:prstGeom prst="straightConnector1">
+              <a:avLst/>
+            </a:prstGeom>
+            <a:noFill/>
+            <a:ln w="12700" cap="flat" cmpd="sng" algn="ctr">
+              <a:solidFill>
+                <a:srgbClr val="212733"/>
+              </a:solidFill>
+              <a:prstDash val="solid"/>
+              <a:round/>
+              <a:headEnd type="none" w="med" len="med"/>
+              <a:tailEnd type="triangle"/>
+            </a:ln>
+            <a:effectLst/>
+          </p:spPr>
+        </p:cxnSp>
+        <p:cxnSp>
+          <p:nvCxnSpPr>
+            <p:cNvPr id="29" name="Straight Arrow Connector 28">
+              <a:extLst>
+                <a:ext uri="{FF2B5EF4-FFF2-40B4-BE49-F238E27FC236}">
+                  <a16:creationId xmlns:a16="http://schemas.microsoft.com/office/drawing/2014/main" id="{B9C17A1A-A6C6-4BDB-942A-F2AD9AF6BD4D}"/>
+                </a:ext>
+              </a:extLst>
+            </p:cNvPr>
+            <p:cNvCxnSpPr>
+              <a:cxnSpLocks/>
+            </p:cNvCxnSpPr>
+            <p:nvPr/>
+          </p:nvCxnSpPr>
+          <p:spPr bwMode="auto">
+            <a:xfrm flipV="1">
+              <a:off x="7889768" y="2242357"/>
+              <a:ext cx="0" cy="376184"/>
+            </a:xfrm>
+            <a:prstGeom prst="straightConnector1">
+              <a:avLst/>
+            </a:prstGeom>
+            <a:noFill/>
+            <a:ln w="12700" cap="flat" cmpd="sng" algn="ctr">
+              <a:solidFill>
+                <a:srgbClr val="212733"/>
+              </a:solidFill>
+              <a:prstDash val="solid"/>
+              <a:round/>
+              <a:headEnd type="none" w="med" len="med"/>
+              <a:tailEnd type="triangle"/>
+            </a:ln>
+            <a:effectLst/>
+          </p:spPr>
+        </p:cxnSp>
+      </p:grpSp>
+      <p:grpSp>
+        <p:nvGrpSpPr>
+          <p:cNvPr id="30" name="Group 29">
+            <a:extLst>
+              <a:ext uri="{FF2B5EF4-FFF2-40B4-BE49-F238E27FC236}">
+                <a16:creationId xmlns:a16="http://schemas.microsoft.com/office/drawing/2014/main" id="{830EFA46-C712-4DCE-B41C-11B343605DB8}"/>
+              </a:ext>
+            </a:extLst>
+          </p:cNvPr>
+          <p:cNvGrpSpPr/>
+          <p:nvPr/>
+        </p:nvGrpSpPr>
+        <p:grpSpPr>
+          <a:xfrm flipH="1">
+            <a:off x="10238815" y="2495572"/>
+            <a:ext cx="453040" cy="314613"/>
+            <a:chOff x="7697587" y="2303928"/>
+            <a:chExt cx="453040" cy="314613"/>
+          </a:xfrm>
+        </p:grpSpPr>
+        <p:cxnSp>
+          <p:nvCxnSpPr>
+            <p:cNvPr id="31" name="Straight Arrow Connector 30">
+              <a:extLst>
+                <a:ext uri="{FF2B5EF4-FFF2-40B4-BE49-F238E27FC236}">
+                  <a16:creationId xmlns:a16="http://schemas.microsoft.com/office/drawing/2014/main" id="{F11C32E9-9EFB-4E81-9E86-A18FD3BC1E0B}"/>
+                </a:ext>
+              </a:extLst>
+            </p:cNvPr>
+            <p:cNvCxnSpPr>
+              <a:cxnSpLocks/>
+            </p:cNvCxnSpPr>
+            <p:nvPr/>
+          </p:nvCxnSpPr>
+          <p:spPr bwMode="auto">
+            <a:xfrm>
+              <a:off x="7889768" y="2618541"/>
+              <a:ext cx="260859" cy="0"/>
+            </a:xfrm>
+            <a:prstGeom prst="straightConnector1">
+              <a:avLst/>
+            </a:prstGeom>
+            <a:noFill/>
+            <a:ln w="12700" cap="flat" cmpd="sng" algn="ctr">
+              <a:solidFill>
+                <a:srgbClr val="212733"/>
+              </a:solidFill>
+              <a:prstDash val="solid"/>
+              <a:round/>
+              <a:headEnd type="none" w="med" len="med"/>
+              <a:tailEnd type="triangle"/>
+            </a:ln>
+            <a:effectLst/>
+          </p:spPr>
+        </p:cxnSp>
+        <p:cxnSp>
+          <p:nvCxnSpPr>
+            <p:cNvPr id="32" name="Straight Arrow Connector 31">
+              <a:extLst>
+                <a:ext uri="{FF2B5EF4-FFF2-40B4-BE49-F238E27FC236}">
+                  <a16:creationId xmlns:a16="http://schemas.microsoft.com/office/drawing/2014/main" id="{B8776AC4-27AC-44B9-87E2-114F91BA3043}"/>
+                </a:ext>
+              </a:extLst>
+            </p:cNvPr>
+            <p:cNvCxnSpPr>
+              <a:cxnSpLocks/>
+            </p:cNvCxnSpPr>
+            <p:nvPr/>
+          </p:nvCxnSpPr>
+          <p:spPr bwMode="auto">
+            <a:xfrm flipH="1" flipV="1">
+              <a:off x="7697587" y="2426361"/>
+              <a:ext cx="192180" cy="192180"/>
+            </a:xfrm>
+            <a:prstGeom prst="straightConnector1">
+              <a:avLst/>
+            </a:prstGeom>
+            <a:noFill/>
+            <a:ln w="12700" cap="flat" cmpd="sng" algn="ctr">
+              <a:solidFill>
+                <a:srgbClr val="212733"/>
+              </a:solidFill>
+              <a:prstDash val="solid"/>
+              <a:round/>
+              <a:headEnd type="none" w="med" len="med"/>
+              <a:tailEnd type="triangle"/>
+            </a:ln>
+            <a:effectLst/>
+          </p:spPr>
+        </p:cxnSp>
+        <p:cxnSp>
+          <p:nvCxnSpPr>
+            <p:cNvPr id="33" name="Straight Arrow Connector 32">
+              <a:extLst>
+                <a:ext uri="{FF2B5EF4-FFF2-40B4-BE49-F238E27FC236}">
+                  <a16:creationId xmlns:a16="http://schemas.microsoft.com/office/drawing/2014/main" id="{4CD943F9-A954-4C53-B58E-207EAD28D7C6}"/>
+                </a:ext>
+              </a:extLst>
+            </p:cNvPr>
+            <p:cNvCxnSpPr>
+              <a:cxnSpLocks/>
+            </p:cNvCxnSpPr>
+            <p:nvPr/>
+          </p:nvCxnSpPr>
+          <p:spPr bwMode="auto">
+            <a:xfrm flipH="1" flipV="1">
+              <a:off x="7889768" y="2303928"/>
+              <a:ext cx="0" cy="314613"/>
+            </a:xfrm>
+            <a:prstGeom prst="straightConnector1">
+              <a:avLst/>
+            </a:prstGeom>
+            <a:noFill/>
+            <a:ln w="12700" cap="flat" cmpd="sng" algn="ctr">
+              <a:solidFill>
+                <a:srgbClr val="212733"/>
+              </a:solidFill>
+              <a:prstDash val="solid"/>
+              <a:round/>
+              <a:headEnd type="none" w="med" len="med"/>
+              <a:tailEnd type="triangle"/>
+            </a:ln>
+            <a:effectLst/>
+          </p:spPr>
+        </p:cxnSp>
+      </p:grpSp>
     </p:spTree>
     <p:extLst>
       <p:ext uri="{BB962C8B-B14F-4D97-AF65-F5344CB8AC3E}">
@@ -29156,6 +29884,2646 @@
 </file>
 
 <file path=ppt/slides/slide7.xml><?xml version="1.0" encoding="utf-8"?>
+<p:sld xmlns:a="http://schemas.openxmlformats.org/drawingml/2006/main" xmlns:r="http://schemas.openxmlformats.org/officeDocument/2006/relationships" xmlns:p="http://schemas.openxmlformats.org/presentationml/2006/main">
+  <p:cSld>
+    <p:spTree>
+      <p:nvGrpSpPr>
+        <p:cNvPr id="1" name=""/>
+        <p:cNvGrpSpPr/>
+        <p:nvPr/>
+      </p:nvGrpSpPr>
+      <p:grpSpPr>
+        <a:xfrm>
+          <a:off x="0" y="0"/>
+          <a:ext cx="0" cy="0"/>
+          <a:chOff x="0" y="0"/>
+          <a:chExt cx="0" cy="0"/>
+        </a:xfrm>
+      </p:grpSpPr>
+      <p:sp>
+        <p:nvSpPr>
+          <p:cNvPr id="2" name="Text Placeholder 1">
+            <a:extLst>
+              <a:ext uri="{FF2B5EF4-FFF2-40B4-BE49-F238E27FC236}">
+                <a16:creationId xmlns:a16="http://schemas.microsoft.com/office/drawing/2014/main" id="{F0566B69-F131-424F-998E-1BDC509E7E74}"/>
+              </a:ext>
+            </a:extLst>
+          </p:cNvPr>
+          <p:cNvSpPr>
+            <a:spLocks noGrp="1"/>
+          </p:cNvSpPr>
+          <p:nvPr>
+            <p:ph type="body" sz="quarter" idx="10"/>
+          </p:nvPr>
+        </p:nvSpPr>
+        <p:spPr>
+          <a:xfrm>
+            <a:off x="5" y="123832"/>
+            <a:ext cx="8715006" cy="507700"/>
+          </a:xfrm>
+        </p:spPr>
+        <p:txBody>
+          <a:bodyPr/>
+          <a:lstStyle/>
+          <a:p>
+            <a:r>
+              <a:rPr kumimoji="1" lang="en-US" altLang="ja-JP" dirty="0"/>
+              <a:t>Round-trip propagation (Laboratory coordinate)</a:t>
+            </a:r>
+            <a:endParaRPr kumimoji="1" lang="ja-JP" altLang="en-US" dirty="0"/>
+          </a:p>
+        </p:txBody>
+      </p:sp>
+      <mc:AlternateContent xmlns:mc="http://schemas.openxmlformats.org/markup-compatibility/2006">
+        <mc:Choice xmlns:a14="http://schemas.microsoft.com/office/drawing/2010/main" Requires="a14">
+          <p:sp>
+            <p:nvSpPr>
+              <p:cNvPr id="3" name="TextBox 2">
+                <a:extLst>
+                  <a:ext uri="{FF2B5EF4-FFF2-40B4-BE49-F238E27FC236}">
+                    <a16:creationId xmlns:a16="http://schemas.microsoft.com/office/drawing/2014/main" id="{990C80BE-375A-48FD-9C4C-E520485939F5}"/>
+                  </a:ext>
+                </a:extLst>
+              </p:cNvPr>
+              <p:cNvSpPr txBox="1"/>
+              <p:nvPr/>
+            </p:nvSpPr>
+            <p:spPr>
+              <a:xfrm>
+                <a:off x="1291575" y="812693"/>
+                <a:ext cx="2165465" cy="465384"/>
+              </a:xfrm>
+              <a:prstGeom prst="rect">
+                <a:avLst/>
+              </a:prstGeom>
+              <a:noFill/>
+            </p:spPr>
+            <p:txBody>
+              <a:bodyPr wrap="none" lIns="0" tIns="0" rIns="0" bIns="0" rtlCol="0">
+                <a:spAutoFit/>
+              </a:bodyPr>
+              <a:lstStyle/>
+              <a:p>
+                <a:pPr algn="ctr"/>
+                <a14:m>
+                  <m:oMathPara xmlns:m="http://schemas.openxmlformats.org/officeDocument/2006/math">
+                    <m:oMathParaPr>
+                      <m:jc m:val="centerGroup"/>
+                    </m:oMathParaPr>
+                    <m:oMath xmlns:m="http://schemas.openxmlformats.org/officeDocument/2006/math">
+                      <m:sSub>
+                        <m:sSubPr>
+                          <m:ctrlPr>
+                            <a:rPr kumimoji="1" lang="en-US" altLang="ja-JP" sz="2800" b="1" i="1" smtClean="0">
+                              <a:solidFill>
+                                <a:srgbClr val="212733"/>
+                              </a:solidFill>
+                              <a:latin typeface="Cambria Math" panose="02040503050406030204" pitchFamily="18" charset="0"/>
+                              <a:ea typeface="+mn-ea"/>
+                              <a:cs typeface="Arial" panose="020B0604020202020204" pitchFamily="34" charset="0"/>
+                            </a:rPr>
+                          </m:ctrlPr>
+                        </m:sSubPr>
+                        <m:e>
+                          <m:r>
+                            <m:rPr>
+                              <m:nor/>
+                            </m:rPr>
+                            <a:rPr kumimoji="1" lang="en-US" altLang="ja-JP" sz="2800" b="1" i="0" smtClean="0">
+                              <a:solidFill>
+                                <a:srgbClr val="212733"/>
+                              </a:solidFill>
+                              <a:latin typeface="Cambria Math" panose="02040503050406030204" pitchFamily="18" charset="0"/>
+                              <a:ea typeface="+mn-ea"/>
+                              <a:cs typeface="Arial" panose="020B0604020202020204" pitchFamily="34" charset="0"/>
+                            </a:rPr>
+                            <m:t>T</m:t>
+                          </m:r>
+                        </m:e>
+                        <m:sub>
+                          <m:r>
+                            <a:rPr kumimoji="1" lang="en-US" altLang="ja-JP" sz="2800" b="0" i="1" smtClean="0">
+                              <a:solidFill>
+                                <a:srgbClr val="212733"/>
+                              </a:solidFill>
+                              <a:latin typeface="Cambria Math" panose="02040503050406030204" pitchFamily="18" charset="0"/>
+                              <a:ea typeface="+mn-ea"/>
+                              <a:cs typeface="Arial" panose="020B0604020202020204" pitchFamily="34" charset="0"/>
+                            </a:rPr>
+                            <m:t>𝑎𝑙𝑙</m:t>
+                          </m:r>
+                        </m:sub>
+                      </m:sSub>
+                      <m:r>
+                        <a:rPr kumimoji="1" lang="en-US" altLang="ja-JP" sz="2800" i="1" smtClean="0">
+                          <a:solidFill>
+                            <a:srgbClr val="212733"/>
+                          </a:solidFill>
+                          <a:latin typeface="Cambria Math" panose="02040503050406030204" pitchFamily="18" charset="0"/>
+                          <a:ea typeface="+mn-ea"/>
+                          <a:cs typeface="Arial" panose="020B0604020202020204" pitchFamily="34" charset="0"/>
+                        </a:rPr>
+                        <m:t>=</m:t>
+                      </m:r>
+                      <m:sSub>
+                        <m:sSubPr>
+                          <m:ctrlPr>
+                            <a:rPr lang="en-US" altLang="ja-JP" sz="2800" b="1" i="1">
+                              <a:solidFill>
+                                <a:srgbClr val="212733"/>
+                              </a:solidFill>
+                              <a:latin typeface="Cambria Math" panose="02040503050406030204" pitchFamily="18" charset="0"/>
+                              <a:cs typeface="Arial" panose="020B0604020202020204" pitchFamily="34" charset="0"/>
+                            </a:rPr>
+                          </m:ctrlPr>
+                        </m:sSubPr>
+                        <m:e>
+                          <m:r>
+                            <a:rPr lang="en-US" altLang="ja-JP" sz="2800" b="1" i="0" smtClean="0">
+                              <a:solidFill>
+                                <a:srgbClr val="212733"/>
+                              </a:solidFill>
+                              <a:latin typeface="Cambria Math" panose="02040503050406030204" pitchFamily="18" charset="0"/>
+                              <a:cs typeface="Arial" panose="020B0604020202020204" pitchFamily="34" charset="0"/>
+                            </a:rPr>
+                            <m:t>𝐓</m:t>
+                          </m:r>
+                        </m:e>
+                        <m:sub>
+                          <m:r>
+                            <a:rPr lang="en-US" altLang="ja-JP" sz="2800" i="1">
+                              <a:solidFill>
+                                <a:srgbClr val="212733"/>
+                              </a:solidFill>
+                              <a:latin typeface="Cambria Math" panose="02040503050406030204" pitchFamily="18" charset="0"/>
+                              <a:cs typeface="Arial" panose="020B0604020202020204" pitchFamily="34" charset="0"/>
+                            </a:rPr>
+                            <m:t>𝑏</m:t>
+                          </m:r>
+                        </m:sub>
+                      </m:sSub>
+                      <m:sSub>
+                        <m:sSubPr>
+                          <m:ctrlPr>
+                            <a:rPr lang="en-US" altLang="ja-JP" sz="2800" b="1" i="1" smtClean="0">
+                              <a:solidFill>
+                                <a:srgbClr val="212733"/>
+                              </a:solidFill>
+                              <a:latin typeface="Cambria Math" panose="02040503050406030204" pitchFamily="18" charset="0"/>
+                              <a:cs typeface="Arial" panose="020B0604020202020204" pitchFamily="34" charset="0"/>
+                            </a:rPr>
+                          </m:ctrlPr>
+                        </m:sSubPr>
+                        <m:e>
+                          <m:r>
+                            <m:rPr>
+                              <m:nor/>
+                            </m:rPr>
+                            <a:rPr lang="en-US" altLang="ja-JP" sz="2800" b="1" i="0" smtClean="0">
+                              <a:solidFill>
+                                <a:srgbClr val="212733"/>
+                              </a:solidFill>
+                              <a:latin typeface="Cambria Math" panose="02040503050406030204" pitchFamily="18" charset="0"/>
+                              <a:cs typeface="Arial" panose="020B0604020202020204" pitchFamily="34" charset="0"/>
+                            </a:rPr>
+                            <m:t>T</m:t>
+                          </m:r>
+                        </m:e>
+                        <m:sub>
+                          <m:r>
+                            <a:rPr lang="en-US" altLang="ja-JP" sz="2800" b="0" i="1" smtClean="0">
+                              <a:solidFill>
+                                <a:srgbClr val="212733"/>
+                              </a:solidFill>
+                              <a:latin typeface="Cambria Math" panose="02040503050406030204" pitchFamily="18" charset="0"/>
+                              <a:cs typeface="Arial" panose="020B0604020202020204" pitchFamily="34" charset="0"/>
+                            </a:rPr>
+                            <m:t>𝑟</m:t>
+                          </m:r>
+                        </m:sub>
+                      </m:sSub>
+                      <m:sSub>
+                        <m:sSubPr>
+                          <m:ctrlPr>
+                            <a:rPr kumimoji="1" lang="en-US" altLang="ja-JP" sz="2800" i="1" smtClean="0">
+                              <a:solidFill>
+                                <a:srgbClr val="212733"/>
+                              </a:solidFill>
+                              <a:latin typeface="Cambria Math" panose="02040503050406030204" pitchFamily="18" charset="0"/>
+                              <a:ea typeface="+mn-ea"/>
+                              <a:cs typeface="Arial" panose="020B0604020202020204" pitchFamily="34" charset="0"/>
+                            </a:rPr>
+                          </m:ctrlPr>
+                        </m:sSubPr>
+                        <m:e>
+                          <m:r>
+                            <m:rPr>
+                              <m:nor/>
+                            </m:rPr>
+                            <a:rPr lang="en-US" altLang="ja-JP" sz="2800" b="1" i="0" smtClean="0">
+                              <a:solidFill>
+                                <a:srgbClr val="212733"/>
+                              </a:solidFill>
+                              <a:latin typeface="Cambria Math" panose="02040503050406030204" pitchFamily="18" charset="0"/>
+                              <a:cs typeface="Arial" panose="020B0604020202020204" pitchFamily="34" charset="0"/>
+                            </a:rPr>
+                            <m:t>T</m:t>
+                          </m:r>
+                        </m:e>
+                        <m:sub>
+                          <m:r>
+                            <a:rPr kumimoji="1" lang="en-US" altLang="ja-JP" sz="2800" b="0" i="1" smtClean="0">
+                              <a:solidFill>
+                                <a:srgbClr val="212733"/>
+                              </a:solidFill>
+                              <a:latin typeface="Cambria Math" panose="02040503050406030204" pitchFamily="18" charset="0"/>
+                              <a:ea typeface="+mn-ea"/>
+                              <a:cs typeface="Arial" panose="020B0604020202020204" pitchFamily="34" charset="0"/>
+                            </a:rPr>
+                            <m:t>𝑓</m:t>
+                          </m:r>
+                        </m:sub>
+                      </m:sSub>
+                    </m:oMath>
+                  </m:oMathPara>
+                </a14:m>
+                <a:endParaRPr kumimoji="1" lang="ja-JP" altLang="en-US" sz="2800" dirty="0">
+                  <a:solidFill>
+                    <a:srgbClr val="212733"/>
+                  </a:solidFill>
+                  <a:latin typeface="+mn-lt"/>
+                  <a:ea typeface="+mn-ea"/>
+                  <a:cs typeface="Arial" panose="020B0604020202020204" pitchFamily="34" charset="0"/>
+                </a:endParaRPr>
+              </a:p>
+            </p:txBody>
+          </p:sp>
+        </mc:Choice>
+        <mc:Fallback>
+          <p:sp>
+            <p:nvSpPr>
+              <p:cNvPr id="3" name="TextBox 2">
+                <a:extLst>
+                  <a:ext uri="{FF2B5EF4-FFF2-40B4-BE49-F238E27FC236}">
+                    <a16:creationId xmlns:a16="http://schemas.microsoft.com/office/drawing/2014/main" id="{990C80BE-375A-48FD-9C4C-E520485939F5}"/>
+                  </a:ext>
+                </a:extLst>
+              </p:cNvPr>
+              <p:cNvSpPr txBox="1">
+                <a:spLocks noRot="1" noChangeAspect="1" noMove="1" noResize="1" noEditPoints="1" noAdjustHandles="1" noChangeArrowheads="1" noChangeShapeType="1" noTextEdit="1"/>
+              </p:cNvSpPr>
+              <p:nvPr/>
+            </p:nvSpPr>
+            <p:spPr>
+              <a:xfrm>
+                <a:off x="1291575" y="812693"/>
+                <a:ext cx="2165465" cy="465384"/>
+              </a:xfrm>
+              <a:prstGeom prst="rect">
+                <a:avLst/>
+              </a:prstGeom>
+              <a:blipFill>
+                <a:blip r:embed="rId2"/>
+                <a:stretch>
+                  <a:fillRect/>
+                </a:stretch>
+              </a:blipFill>
+            </p:spPr>
+            <p:txBody>
+              <a:bodyPr/>
+              <a:lstStyle/>
+              <a:p>
+                <a:r>
+                  <a:rPr lang="ja-JP" altLang="en-US">
+                    <a:noFill/>
+                  </a:rPr>
+                  <a:t> </a:t>
+                </a:r>
+              </a:p>
+            </p:txBody>
+          </p:sp>
+        </mc:Fallback>
+      </mc:AlternateContent>
+      <p:cxnSp>
+        <p:nvCxnSpPr>
+          <p:cNvPr id="5" name="Straight Connector 4">
+            <a:extLst>
+              <a:ext uri="{FF2B5EF4-FFF2-40B4-BE49-F238E27FC236}">
+                <a16:creationId xmlns:a16="http://schemas.microsoft.com/office/drawing/2014/main" id="{03D09824-C9F5-44AE-8091-A1E6AD864486}"/>
+              </a:ext>
+            </a:extLst>
+          </p:cNvPr>
+          <p:cNvCxnSpPr/>
+          <p:nvPr/>
+        </p:nvCxnSpPr>
+        <p:spPr bwMode="auto">
+          <a:xfrm>
+            <a:off x="9134180" y="1242176"/>
+            <a:ext cx="0" cy="3516923"/>
+          </a:xfrm>
+          <a:prstGeom prst="line">
+            <a:avLst/>
+          </a:prstGeom>
+          <a:noFill/>
+          <a:ln w="12700" cap="flat" cmpd="sng" algn="ctr">
+            <a:solidFill>
+              <a:srgbClr val="212733"/>
+            </a:solidFill>
+            <a:prstDash val="solid"/>
+            <a:round/>
+            <a:headEnd type="none" w="med" len="med"/>
+            <a:tailEnd type="none"/>
+          </a:ln>
+          <a:effectLst/>
+        </p:spPr>
+      </p:cxnSp>
+      <p:cxnSp>
+        <p:nvCxnSpPr>
+          <p:cNvPr id="7" name="Straight Connector 6">
+            <a:extLst>
+              <a:ext uri="{FF2B5EF4-FFF2-40B4-BE49-F238E27FC236}">
+                <a16:creationId xmlns:a16="http://schemas.microsoft.com/office/drawing/2014/main" id="{83E75DE8-5645-4B4A-9F84-0754A2C67BC9}"/>
+              </a:ext>
+            </a:extLst>
+          </p:cNvPr>
+          <p:cNvCxnSpPr/>
+          <p:nvPr/>
+        </p:nvCxnSpPr>
+        <p:spPr bwMode="auto">
+          <a:xfrm>
+            <a:off x="10973028" y="1242176"/>
+            <a:ext cx="0" cy="3567165"/>
+          </a:xfrm>
+          <a:prstGeom prst="line">
+            <a:avLst/>
+          </a:prstGeom>
+          <a:noFill/>
+          <a:ln w="12700" cap="flat" cmpd="sng" algn="ctr">
+            <a:solidFill>
+              <a:srgbClr val="212733"/>
+            </a:solidFill>
+            <a:prstDash val="solid"/>
+            <a:round/>
+            <a:headEnd type="none" w="med" len="med"/>
+            <a:tailEnd type="none"/>
+          </a:ln>
+          <a:effectLst/>
+        </p:spPr>
+      </p:cxnSp>
+      <p:cxnSp>
+        <p:nvCxnSpPr>
+          <p:cNvPr id="9" name="Straight Arrow Connector 8">
+            <a:extLst>
+              <a:ext uri="{FF2B5EF4-FFF2-40B4-BE49-F238E27FC236}">
+                <a16:creationId xmlns:a16="http://schemas.microsoft.com/office/drawing/2014/main" id="{06D35D68-19DE-474C-9B49-C7B461E928CB}"/>
+              </a:ext>
+            </a:extLst>
+          </p:cNvPr>
+          <p:cNvCxnSpPr/>
+          <p:nvPr/>
+        </p:nvCxnSpPr>
+        <p:spPr bwMode="auto">
+          <a:xfrm>
+            <a:off x="9134180" y="2307301"/>
+            <a:ext cx="1838848" cy="0"/>
+          </a:xfrm>
+          <a:prstGeom prst="straightConnector1">
+            <a:avLst/>
+          </a:prstGeom>
+          <a:noFill/>
+          <a:ln w="25400" cap="flat" cmpd="sng" algn="ctr">
+            <a:solidFill>
+              <a:srgbClr val="FF0000"/>
+            </a:solidFill>
+            <a:prstDash val="solid"/>
+            <a:round/>
+            <a:headEnd type="none" w="med" len="med"/>
+            <a:tailEnd type="triangle"/>
+          </a:ln>
+          <a:effectLst/>
+        </p:spPr>
+      </p:cxnSp>
+      <p:cxnSp>
+        <p:nvCxnSpPr>
+          <p:cNvPr id="10" name="Straight Arrow Connector 9">
+            <a:extLst>
+              <a:ext uri="{FF2B5EF4-FFF2-40B4-BE49-F238E27FC236}">
+                <a16:creationId xmlns:a16="http://schemas.microsoft.com/office/drawing/2014/main" id="{FAB04652-E28E-4700-9E5A-E55F2B453838}"/>
+              </a:ext>
+            </a:extLst>
+          </p:cNvPr>
+          <p:cNvCxnSpPr>
+            <a:cxnSpLocks/>
+          </p:cNvCxnSpPr>
+          <p:nvPr/>
+        </p:nvCxnSpPr>
+        <p:spPr bwMode="auto">
+          <a:xfrm flipH="1">
+            <a:off x="9134180" y="2791296"/>
+            <a:ext cx="1838849" cy="0"/>
+          </a:xfrm>
+          <a:prstGeom prst="straightConnector1">
+            <a:avLst/>
+          </a:prstGeom>
+          <a:noFill/>
+          <a:ln w="25400" cap="flat" cmpd="sng" algn="ctr">
+            <a:solidFill>
+              <a:srgbClr val="FF0000"/>
+            </a:solidFill>
+            <a:prstDash val="solid"/>
+            <a:round/>
+            <a:headEnd type="none" w="med" len="med"/>
+            <a:tailEnd type="triangle"/>
+          </a:ln>
+          <a:effectLst/>
+        </p:spPr>
+      </p:cxnSp>
+      <mc:AlternateContent xmlns:mc="http://schemas.openxmlformats.org/markup-compatibility/2006">
+        <mc:Choice xmlns:a14="http://schemas.microsoft.com/office/drawing/2010/main" Requires="a14">
+          <p:sp>
+            <p:nvSpPr>
+              <p:cNvPr id="13" name="TextBox 12">
+                <a:extLst>
+                  <a:ext uri="{FF2B5EF4-FFF2-40B4-BE49-F238E27FC236}">
+                    <a16:creationId xmlns:a16="http://schemas.microsoft.com/office/drawing/2014/main" id="{F278ABFD-B5B5-48C2-80B7-98823A268194}"/>
+                  </a:ext>
+                </a:extLst>
+              </p:cNvPr>
+              <p:cNvSpPr txBox="1"/>
+              <p:nvPr/>
+            </p:nvSpPr>
+            <p:spPr>
+              <a:xfrm>
+                <a:off x="9868394" y="1817259"/>
+                <a:ext cx="370421" cy="398955"/>
+              </a:xfrm>
+              <a:prstGeom prst="rect">
+                <a:avLst/>
+              </a:prstGeom>
+              <a:noFill/>
+            </p:spPr>
+            <p:txBody>
+              <a:bodyPr wrap="none" lIns="0" tIns="0" rIns="0" bIns="0" rtlCol="0">
+                <a:spAutoFit/>
+              </a:bodyPr>
+              <a:lstStyle/>
+              <a:p>
+                <a:pPr algn="ctr"/>
+                <a14:m>
+                  <m:oMathPara xmlns:m="http://schemas.openxmlformats.org/officeDocument/2006/math">
+                    <m:oMathParaPr>
+                      <m:jc m:val="centerGroup"/>
+                    </m:oMathParaPr>
+                    <m:oMath xmlns:m="http://schemas.openxmlformats.org/officeDocument/2006/math">
+                      <m:sSub>
+                        <m:sSubPr>
+                          <m:ctrlPr>
+                            <a:rPr kumimoji="1" lang="en-US" altLang="ja-JP" sz="2400" i="1" smtClean="0">
+                              <a:solidFill>
+                                <a:srgbClr val="212733"/>
+                              </a:solidFill>
+                              <a:latin typeface="Cambria Math" panose="02040503050406030204" pitchFamily="18" charset="0"/>
+                              <a:ea typeface="+mn-ea"/>
+                              <a:cs typeface="Arial" panose="020B0604020202020204" pitchFamily="34" charset="0"/>
+                            </a:rPr>
+                          </m:ctrlPr>
+                        </m:sSubPr>
+                        <m:e>
+                          <m:r>
+                            <m:rPr>
+                              <m:nor/>
+                            </m:rPr>
+                            <a:rPr lang="en-US" altLang="ja-JP" sz="2400" b="1" i="0" smtClean="0">
+                              <a:solidFill>
+                                <a:srgbClr val="212733"/>
+                              </a:solidFill>
+                              <a:latin typeface="Cambria Math" panose="02040503050406030204" pitchFamily="18" charset="0"/>
+                              <a:cs typeface="Arial" panose="020B0604020202020204" pitchFamily="34" charset="0"/>
+                            </a:rPr>
+                            <m:t>T</m:t>
+                          </m:r>
+                        </m:e>
+                        <m:sub>
+                          <m:r>
+                            <a:rPr kumimoji="1" lang="en-US" altLang="ja-JP" sz="2400" b="0" i="1" smtClean="0">
+                              <a:solidFill>
+                                <a:srgbClr val="212733"/>
+                              </a:solidFill>
+                              <a:latin typeface="Cambria Math" panose="02040503050406030204" pitchFamily="18" charset="0"/>
+                              <a:ea typeface="+mn-ea"/>
+                              <a:cs typeface="Arial" panose="020B0604020202020204" pitchFamily="34" charset="0"/>
+                            </a:rPr>
+                            <m:t>𝑓</m:t>
+                          </m:r>
+                        </m:sub>
+                      </m:sSub>
+                    </m:oMath>
+                  </m:oMathPara>
+                </a14:m>
+                <a:endParaRPr kumimoji="1" lang="ja-JP" altLang="en-US" sz="2400" dirty="0">
+                  <a:solidFill>
+                    <a:srgbClr val="212733"/>
+                  </a:solidFill>
+                  <a:latin typeface="+mn-lt"/>
+                  <a:ea typeface="+mn-ea"/>
+                  <a:cs typeface="Arial" panose="020B0604020202020204" pitchFamily="34" charset="0"/>
+                </a:endParaRPr>
+              </a:p>
+            </p:txBody>
+          </p:sp>
+        </mc:Choice>
+        <mc:Fallback>
+          <p:sp>
+            <p:nvSpPr>
+              <p:cNvPr id="13" name="TextBox 12">
+                <a:extLst>
+                  <a:ext uri="{FF2B5EF4-FFF2-40B4-BE49-F238E27FC236}">
+                    <a16:creationId xmlns:a16="http://schemas.microsoft.com/office/drawing/2014/main" id="{F278ABFD-B5B5-48C2-80B7-98823A268194}"/>
+                  </a:ext>
+                </a:extLst>
+              </p:cNvPr>
+              <p:cNvSpPr txBox="1">
+                <a:spLocks noRot="1" noChangeAspect="1" noMove="1" noResize="1" noEditPoints="1" noAdjustHandles="1" noChangeArrowheads="1" noChangeShapeType="1" noTextEdit="1"/>
+              </p:cNvSpPr>
+              <p:nvPr/>
+            </p:nvSpPr>
+            <p:spPr>
+              <a:xfrm>
+                <a:off x="9868394" y="1817259"/>
+                <a:ext cx="370421" cy="398955"/>
+              </a:xfrm>
+              <a:prstGeom prst="rect">
+                <a:avLst/>
+              </a:prstGeom>
+              <a:blipFill>
+                <a:blip r:embed="rId3"/>
+                <a:stretch>
+                  <a:fillRect l="-29508" b="-25758"/>
+                </a:stretch>
+              </a:blipFill>
+            </p:spPr>
+            <p:txBody>
+              <a:bodyPr/>
+              <a:lstStyle/>
+              <a:p>
+                <a:r>
+                  <a:rPr lang="ja-JP" altLang="en-US">
+                    <a:noFill/>
+                  </a:rPr>
+                  <a:t> </a:t>
+                </a:r>
+              </a:p>
+            </p:txBody>
+          </p:sp>
+        </mc:Fallback>
+      </mc:AlternateContent>
+      <mc:AlternateContent xmlns:mc="http://schemas.openxmlformats.org/markup-compatibility/2006">
+        <mc:Choice xmlns:a14="http://schemas.microsoft.com/office/drawing/2010/main" Requires="a14">
+          <p:sp>
+            <p:nvSpPr>
+              <p:cNvPr id="16" name="TextBox 15">
+                <a:extLst>
+                  <a:ext uri="{FF2B5EF4-FFF2-40B4-BE49-F238E27FC236}">
+                    <a16:creationId xmlns:a16="http://schemas.microsoft.com/office/drawing/2014/main" id="{DB358A7C-40D4-47FE-9EB7-62E31AF98007}"/>
+                  </a:ext>
+                </a:extLst>
+              </p:cNvPr>
+              <p:cNvSpPr txBox="1"/>
+              <p:nvPr/>
+            </p:nvSpPr>
+            <p:spPr>
+              <a:xfrm>
+                <a:off x="9859063" y="2875330"/>
+                <a:ext cx="389081" cy="369332"/>
+              </a:xfrm>
+              <a:prstGeom prst="rect">
+                <a:avLst/>
+              </a:prstGeom>
+              <a:noFill/>
+            </p:spPr>
+            <p:txBody>
+              <a:bodyPr wrap="none" lIns="0" tIns="0" rIns="0" bIns="0" rtlCol="0">
+                <a:spAutoFit/>
+              </a:bodyPr>
+              <a:lstStyle/>
+              <a:p>
+                <a:pPr algn="ctr"/>
+                <a14:m>
+                  <m:oMathPara xmlns:m="http://schemas.openxmlformats.org/officeDocument/2006/math">
+                    <m:oMathParaPr>
+                      <m:jc m:val="centerGroup"/>
+                    </m:oMathParaPr>
+                    <m:oMath xmlns:m="http://schemas.openxmlformats.org/officeDocument/2006/math">
+                      <m:sSub>
+                        <m:sSubPr>
+                          <m:ctrlPr>
+                            <a:rPr kumimoji="1" lang="en-US" altLang="ja-JP" sz="2400" i="1" smtClean="0">
+                              <a:solidFill>
+                                <a:srgbClr val="212733"/>
+                              </a:solidFill>
+                              <a:latin typeface="Cambria Math" panose="02040503050406030204" pitchFamily="18" charset="0"/>
+                              <a:ea typeface="+mn-ea"/>
+                              <a:cs typeface="Arial" panose="020B0604020202020204" pitchFamily="34" charset="0"/>
+                            </a:rPr>
+                          </m:ctrlPr>
+                        </m:sSubPr>
+                        <m:e>
+                          <m:r>
+                            <m:rPr>
+                              <m:nor/>
+                            </m:rPr>
+                            <a:rPr kumimoji="1" lang="en-US" altLang="ja-JP" sz="2400" b="1" i="0" smtClean="0">
+                              <a:solidFill>
+                                <a:srgbClr val="212733"/>
+                              </a:solidFill>
+                              <a:latin typeface="Cambria Math" panose="02040503050406030204" pitchFamily="18" charset="0"/>
+                              <a:ea typeface="+mn-ea"/>
+                              <a:cs typeface="Arial" panose="020B0604020202020204" pitchFamily="34" charset="0"/>
+                            </a:rPr>
+                            <m:t>T</m:t>
+                          </m:r>
+                        </m:e>
+                        <m:sub>
+                          <m:r>
+                            <a:rPr kumimoji="1" lang="en-US" altLang="ja-JP" sz="2400" b="0" i="1" smtClean="0">
+                              <a:solidFill>
+                                <a:srgbClr val="212733"/>
+                              </a:solidFill>
+                              <a:latin typeface="Cambria Math" panose="02040503050406030204" pitchFamily="18" charset="0"/>
+                              <a:ea typeface="+mn-ea"/>
+                              <a:cs typeface="Arial" panose="020B0604020202020204" pitchFamily="34" charset="0"/>
+                            </a:rPr>
+                            <m:t>𝑏</m:t>
+                          </m:r>
+                        </m:sub>
+                      </m:sSub>
+                    </m:oMath>
+                  </m:oMathPara>
+                </a14:m>
+                <a:endParaRPr kumimoji="1" lang="ja-JP" altLang="en-US" sz="2400" dirty="0">
+                  <a:solidFill>
+                    <a:srgbClr val="212733"/>
+                  </a:solidFill>
+                  <a:latin typeface="+mn-lt"/>
+                  <a:ea typeface="+mn-ea"/>
+                  <a:cs typeface="Arial" panose="020B0604020202020204" pitchFamily="34" charset="0"/>
+                </a:endParaRPr>
+              </a:p>
+            </p:txBody>
+          </p:sp>
+        </mc:Choice>
+        <mc:Fallback>
+          <p:sp>
+            <p:nvSpPr>
+              <p:cNvPr id="16" name="TextBox 15">
+                <a:extLst>
+                  <a:ext uri="{FF2B5EF4-FFF2-40B4-BE49-F238E27FC236}">
+                    <a16:creationId xmlns:a16="http://schemas.microsoft.com/office/drawing/2014/main" id="{DB358A7C-40D4-47FE-9EB7-62E31AF98007}"/>
+                  </a:ext>
+                </a:extLst>
+              </p:cNvPr>
+              <p:cNvSpPr txBox="1">
+                <a:spLocks noRot="1" noChangeAspect="1" noMove="1" noResize="1" noEditPoints="1" noAdjustHandles="1" noChangeArrowheads="1" noChangeShapeType="1" noTextEdit="1"/>
+              </p:cNvSpPr>
+              <p:nvPr/>
+            </p:nvSpPr>
+            <p:spPr>
+              <a:xfrm>
+                <a:off x="9859063" y="2875330"/>
+                <a:ext cx="389081" cy="369332"/>
+              </a:xfrm>
+              <a:prstGeom prst="rect">
+                <a:avLst/>
+              </a:prstGeom>
+              <a:blipFill>
+                <a:blip r:embed="rId4"/>
+                <a:stretch>
+                  <a:fillRect l="-26563" b="-20000"/>
+                </a:stretch>
+              </a:blipFill>
+            </p:spPr>
+            <p:txBody>
+              <a:bodyPr/>
+              <a:lstStyle/>
+              <a:p>
+                <a:r>
+                  <a:rPr lang="ja-JP" altLang="en-US">
+                    <a:noFill/>
+                  </a:rPr>
+                  <a:t> </a:t>
+                </a:r>
+              </a:p>
+            </p:txBody>
+          </p:sp>
+        </mc:Fallback>
+      </mc:AlternateContent>
+      <mc:AlternateContent xmlns:mc="http://schemas.openxmlformats.org/markup-compatibility/2006">
+        <mc:Choice xmlns:a14="http://schemas.microsoft.com/office/drawing/2010/main" Requires="a14">
+          <p:sp>
+            <p:nvSpPr>
+              <p:cNvPr id="17" name="TextBox 16">
+                <a:extLst>
+                  <a:ext uri="{FF2B5EF4-FFF2-40B4-BE49-F238E27FC236}">
+                    <a16:creationId xmlns:a16="http://schemas.microsoft.com/office/drawing/2014/main" id="{14BF5CBB-CA0F-487E-AF51-53F2B9776754}"/>
+                  </a:ext>
+                </a:extLst>
+              </p:cNvPr>
+              <p:cNvSpPr txBox="1"/>
+              <p:nvPr/>
+            </p:nvSpPr>
+            <p:spPr>
+              <a:xfrm>
+                <a:off x="10991208" y="2313159"/>
+                <a:ext cx="374141" cy="369332"/>
+              </a:xfrm>
+              <a:prstGeom prst="rect">
+                <a:avLst/>
+              </a:prstGeom>
+              <a:noFill/>
+            </p:spPr>
+            <p:txBody>
+              <a:bodyPr wrap="none" lIns="0" tIns="0" rIns="0" bIns="0" rtlCol="0">
+                <a:spAutoFit/>
+              </a:bodyPr>
+              <a:lstStyle/>
+              <a:p>
+                <a:pPr algn="ctr"/>
+                <a14:m>
+                  <m:oMathPara xmlns:m="http://schemas.openxmlformats.org/officeDocument/2006/math">
+                    <m:oMathParaPr>
+                      <m:jc m:val="centerGroup"/>
+                    </m:oMathParaPr>
+                    <m:oMath xmlns:m="http://schemas.openxmlformats.org/officeDocument/2006/math">
+                      <m:sSub>
+                        <m:sSubPr>
+                          <m:ctrlPr>
+                            <a:rPr kumimoji="1" lang="en-US" altLang="ja-JP" sz="2400" i="1" smtClean="0">
+                              <a:solidFill>
+                                <a:srgbClr val="212733"/>
+                              </a:solidFill>
+                              <a:latin typeface="Cambria Math" panose="02040503050406030204" pitchFamily="18" charset="0"/>
+                              <a:ea typeface="+mn-ea"/>
+                              <a:cs typeface="Arial" panose="020B0604020202020204" pitchFamily="34" charset="0"/>
+                            </a:rPr>
+                          </m:ctrlPr>
+                        </m:sSubPr>
+                        <m:e>
+                          <m:r>
+                            <m:rPr>
+                              <m:nor/>
+                            </m:rPr>
+                            <a:rPr kumimoji="1" lang="en-US" altLang="ja-JP" sz="2400" b="1" i="0" smtClean="0">
+                              <a:solidFill>
+                                <a:srgbClr val="212733"/>
+                              </a:solidFill>
+                              <a:latin typeface="Cambria Math" panose="02040503050406030204" pitchFamily="18" charset="0"/>
+                              <a:ea typeface="+mn-ea"/>
+                              <a:cs typeface="Arial" panose="020B0604020202020204" pitchFamily="34" charset="0"/>
+                            </a:rPr>
+                            <m:t>T</m:t>
+                          </m:r>
+                        </m:e>
+                        <m:sub>
+                          <m:r>
+                            <a:rPr kumimoji="1" lang="en-US" altLang="ja-JP" sz="2400" b="0" i="1" smtClean="0">
+                              <a:solidFill>
+                                <a:srgbClr val="212733"/>
+                              </a:solidFill>
+                              <a:latin typeface="Cambria Math" panose="02040503050406030204" pitchFamily="18" charset="0"/>
+                              <a:ea typeface="+mn-ea"/>
+                              <a:cs typeface="Arial" panose="020B0604020202020204" pitchFamily="34" charset="0"/>
+                            </a:rPr>
+                            <m:t>𝑟</m:t>
+                          </m:r>
+                        </m:sub>
+                      </m:sSub>
+                    </m:oMath>
+                  </m:oMathPara>
+                </a14:m>
+                <a:endParaRPr kumimoji="1" lang="ja-JP" altLang="en-US" sz="2400" dirty="0">
+                  <a:solidFill>
+                    <a:srgbClr val="212733"/>
+                  </a:solidFill>
+                  <a:latin typeface="+mn-lt"/>
+                  <a:ea typeface="+mn-ea"/>
+                  <a:cs typeface="Arial" panose="020B0604020202020204" pitchFamily="34" charset="0"/>
+                </a:endParaRPr>
+              </a:p>
+            </p:txBody>
+          </p:sp>
+        </mc:Choice>
+        <mc:Fallback>
+          <p:sp>
+            <p:nvSpPr>
+              <p:cNvPr id="17" name="TextBox 16">
+                <a:extLst>
+                  <a:ext uri="{FF2B5EF4-FFF2-40B4-BE49-F238E27FC236}">
+                    <a16:creationId xmlns:a16="http://schemas.microsoft.com/office/drawing/2014/main" id="{14BF5CBB-CA0F-487E-AF51-53F2B9776754}"/>
+                  </a:ext>
+                </a:extLst>
+              </p:cNvPr>
+              <p:cNvSpPr txBox="1">
+                <a:spLocks noRot="1" noChangeAspect="1" noMove="1" noResize="1" noEditPoints="1" noAdjustHandles="1" noChangeArrowheads="1" noChangeShapeType="1" noTextEdit="1"/>
+              </p:cNvSpPr>
+              <p:nvPr/>
+            </p:nvSpPr>
+            <p:spPr>
+              <a:xfrm>
+                <a:off x="10991208" y="2313159"/>
+                <a:ext cx="374141" cy="369332"/>
+              </a:xfrm>
+              <a:prstGeom prst="rect">
+                <a:avLst/>
+              </a:prstGeom>
+              <a:blipFill>
+                <a:blip r:embed="rId5"/>
+                <a:stretch>
+                  <a:fillRect l="-27869" b="-13115"/>
+                </a:stretch>
+              </a:blipFill>
+            </p:spPr>
+            <p:txBody>
+              <a:bodyPr/>
+              <a:lstStyle/>
+              <a:p>
+                <a:r>
+                  <a:rPr lang="ja-JP" altLang="en-US">
+                    <a:noFill/>
+                  </a:rPr>
+                  <a:t> </a:t>
+                </a:r>
+              </a:p>
+            </p:txBody>
+          </p:sp>
+        </mc:Fallback>
+      </mc:AlternateContent>
+      <mc:AlternateContent xmlns:mc="http://schemas.openxmlformats.org/markup-compatibility/2006">
+        <mc:Choice xmlns:a14="http://schemas.microsoft.com/office/drawing/2010/main" Requires="a14">
+          <p:sp>
+            <p:nvSpPr>
+              <p:cNvPr id="18" name="TextBox 17">
+                <a:extLst>
+                  <a:ext uri="{FF2B5EF4-FFF2-40B4-BE49-F238E27FC236}">
+                    <a16:creationId xmlns:a16="http://schemas.microsoft.com/office/drawing/2014/main" id="{01D159B9-91AD-44BC-9EE3-B26A49F3B515}"/>
+                  </a:ext>
+                </a:extLst>
+              </p:cNvPr>
+              <p:cNvSpPr txBox="1"/>
+              <p:nvPr/>
+            </p:nvSpPr>
+            <p:spPr>
+              <a:xfrm>
+                <a:off x="2644183" y="1417272"/>
+                <a:ext cx="1138260" cy="429477"/>
+              </a:xfrm>
+              <a:prstGeom prst="rect">
+                <a:avLst/>
+              </a:prstGeom>
+              <a:noFill/>
+            </p:spPr>
+            <p:txBody>
+              <a:bodyPr wrap="none" lIns="0" tIns="0" rIns="0" bIns="0" rtlCol="0">
+                <a:spAutoFit/>
+              </a:bodyPr>
+              <a:lstStyle/>
+              <a:p>
+                <a:pPr algn="ctr"/>
+                <a14:m>
+                  <m:oMathPara xmlns:m="http://schemas.openxmlformats.org/officeDocument/2006/math">
+                    <m:oMathParaPr>
+                      <m:jc m:val="centerGroup"/>
+                    </m:oMathParaPr>
+                    <m:oMath xmlns:m="http://schemas.openxmlformats.org/officeDocument/2006/math">
+                      <m:sSub>
+                        <m:sSubPr>
+                          <m:ctrlPr>
+                            <a:rPr kumimoji="1" lang="en-US" altLang="ja-JP" sz="2400" b="1" i="1" smtClean="0">
+                              <a:solidFill>
+                                <a:srgbClr val="212733"/>
+                              </a:solidFill>
+                              <a:latin typeface="Cambria Math" panose="02040503050406030204" pitchFamily="18" charset="0"/>
+                              <a:ea typeface="+mn-ea"/>
+                              <a:cs typeface="Arial" panose="020B0604020202020204" pitchFamily="34" charset="0"/>
+                            </a:rPr>
+                          </m:ctrlPr>
+                        </m:sSubPr>
+                        <m:e>
+                          <m:r>
+                            <m:rPr>
+                              <m:nor/>
+                            </m:rPr>
+                            <a:rPr lang="en-US" altLang="ja-JP" sz="2400" b="1" i="0" smtClean="0">
+                              <a:solidFill>
+                                <a:srgbClr val="212733"/>
+                              </a:solidFill>
+                              <a:latin typeface="Cambria Math" panose="02040503050406030204" pitchFamily="18" charset="0"/>
+                              <a:cs typeface="Arial" panose="020B0604020202020204" pitchFamily="34" charset="0"/>
+                            </a:rPr>
+                            <m:t>T</m:t>
+                          </m:r>
+                        </m:e>
+                        <m:sub>
+                          <m:r>
+                            <a:rPr kumimoji="1" lang="en-US" altLang="ja-JP" sz="2400" b="0" i="1" smtClean="0">
+                              <a:solidFill>
+                                <a:srgbClr val="212733"/>
+                              </a:solidFill>
+                              <a:latin typeface="Cambria Math" panose="02040503050406030204" pitchFamily="18" charset="0"/>
+                              <a:ea typeface="+mn-ea"/>
+                              <a:cs typeface="Arial" panose="020B0604020202020204" pitchFamily="34" charset="0"/>
+                            </a:rPr>
+                            <m:t>𝑏</m:t>
+                          </m:r>
+                        </m:sub>
+                      </m:sSub>
+                      <m:r>
+                        <a:rPr kumimoji="1" lang="en-US" altLang="ja-JP" sz="2400" i="1" smtClean="0">
+                          <a:solidFill>
+                            <a:srgbClr val="212733"/>
+                          </a:solidFill>
+                          <a:latin typeface="Cambria Math" panose="02040503050406030204" pitchFamily="18" charset="0"/>
+                          <a:ea typeface="+mn-ea"/>
+                          <a:cs typeface="Arial" panose="020B0604020202020204" pitchFamily="34" charset="0"/>
+                        </a:rPr>
+                        <m:t>=</m:t>
+                      </m:r>
+                      <m:sSubSup>
+                        <m:sSubSupPr>
+                          <m:ctrlPr>
+                            <a:rPr kumimoji="1" lang="en-US" altLang="ja-JP" sz="2400" i="1" smtClean="0">
+                              <a:solidFill>
+                                <a:srgbClr val="212733"/>
+                              </a:solidFill>
+                              <a:latin typeface="Cambria Math" panose="02040503050406030204" pitchFamily="18" charset="0"/>
+                              <a:ea typeface="+mn-ea"/>
+                              <a:cs typeface="Arial" panose="020B0604020202020204" pitchFamily="34" charset="0"/>
+                            </a:rPr>
+                          </m:ctrlPr>
+                        </m:sSubSupPr>
+                        <m:e>
+                          <m:r>
+                            <m:rPr>
+                              <m:nor/>
+                            </m:rPr>
+                            <a:rPr kumimoji="1" lang="en-US" altLang="ja-JP" sz="2400" b="1" i="0" smtClean="0">
+                              <a:solidFill>
+                                <a:srgbClr val="212733"/>
+                              </a:solidFill>
+                              <a:latin typeface="Cambria Math" panose="02040503050406030204" pitchFamily="18" charset="0"/>
+                              <a:ea typeface="+mn-ea"/>
+                              <a:cs typeface="Arial" panose="020B0604020202020204" pitchFamily="34" charset="0"/>
+                            </a:rPr>
+                            <m:t>T</m:t>
+                          </m:r>
+                        </m:e>
+                        <m:sub>
+                          <m:r>
+                            <a:rPr kumimoji="1" lang="en-US" altLang="ja-JP" sz="2400" b="0" i="1" smtClean="0">
+                              <a:solidFill>
+                                <a:srgbClr val="212733"/>
+                              </a:solidFill>
+                              <a:latin typeface="Cambria Math" panose="02040503050406030204" pitchFamily="18" charset="0"/>
+                              <a:ea typeface="+mn-ea"/>
+                              <a:cs typeface="Arial" panose="020B0604020202020204" pitchFamily="34" charset="0"/>
+                            </a:rPr>
+                            <m:t>𝑓</m:t>
+                          </m:r>
+                        </m:sub>
+                        <m:sup>
+                          <m:r>
+                            <a:rPr kumimoji="1" lang="en-US" altLang="ja-JP" sz="2400" b="0" i="1" smtClean="0">
+                              <a:solidFill>
+                                <a:srgbClr val="212733"/>
+                              </a:solidFill>
+                              <a:latin typeface="Cambria Math" panose="02040503050406030204" pitchFamily="18" charset="0"/>
+                              <a:ea typeface="+mn-ea"/>
+                              <a:cs typeface="Arial" panose="020B0604020202020204" pitchFamily="34" charset="0"/>
+                            </a:rPr>
+                            <m:t>𝑇</m:t>
+                          </m:r>
+                        </m:sup>
+                      </m:sSubSup>
+                    </m:oMath>
+                  </m:oMathPara>
+                </a14:m>
+                <a:endParaRPr kumimoji="1" lang="ja-JP" altLang="en-US" sz="2400" dirty="0">
+                  <a:solidFill>
+                    <a:srgbClr val="212733"/>
+                  </a:solidFill>
+                  <a:latin typeface="+mn-lt"/>
+                  <a:ea typeface="+mn-ea"/>
+                  <a:cs typeface="Arial" panose="020B0604020202020204" pitchFamily="34" charset="0"/>
+                </a:endParaRPr>
+              </a:p>
+            </p:txBody>
+          </p:sp>
+        </mc:Choice>
+        <mc:Fallback>
+          <p:sp>
+            <p:nvSpPr>
+              <p:cNvPr id="18" name="TextBox 17">
+                <a:extLst>
+                  <a:ext uri="{FF2B5EF4-FFF2-40B4-BE49-F238E27FC236}">
+                    <a16:creationId xmlns:a16="http://schemas.microsoft.com/office/drawing/2014/main" id="{01D159B9-91AD-44BC-9EE3-B26A49F3B515}"/>
+                  </a:ext>
+                </a:extLst>
+              </p:cNvPr>
+              <p:cNvSpPr txBox="1">
+                <a:spLocks noRot="1" noChangeAspect="1" noMove="1" noResize="1" noEditPoints="1" noAdjustHandles="1" noChangeArrowheads="1" noChangeShapeType="1" noTextEdit="1"/>
+              </p:cNvSpPr>
+              <p:nvPr/>
+            </p:nvSpPr>
+            <p:spPr>
+              <a:xfrm>
+                <a:off x="2644183" y="1417272"/>
+                <a:ext cx="1138260" cy="429477"/>
+              </a:xfrm>
+              <a:prstGeom prst="rect">
+                <a:avLst/>
+              </a:prstGeom>
+              <a:blipFill>
+                <a:blip r:embed="rId6"/>
+                <a:stretch>
+                  <a:fillRect/>
+                </a:stretch>
+              </a:blipFill>
+            </p:spPr>
+            <p:txBody>
+              <a:bodyPr/>
+              <a:lstStyle/>
+              <a:p>
+                <a:r>
+                  <a:rPr lang="ja-JP" altLang="en-US">
+                    <a:noFill/>
+                  </a:rPr>
+                  <a:t> </a:t>
+                </a:r>
+              </a:p>
+            </p:txBody>
+          </p:sp>
+        </mc:Fallback>
+      </mc:AlternateContent>
+      <mc:AlternateContent xmlns:mc="http://schemas.openxmlformats.org/markup-compatibility/2006">
+        <mc:Choice xmlns:a14="http://schemas.microsoft.com/office/drawing/2010/main" Requires="a14">
+          <p:sp>
+            <p:nvSpPr>
+              <p:cNvPr id="19" name="TextBox 18">
+                <a:extLst>
+                  <a:ext uri="{FF2B5EF4-FFF2-40B4-BE49-F238E27FC236}">
+                    <a16:creationId xmlns:a16="http://schemas.microsoft.com/office/drawing/2014/main" id="{A6C2E9B3-EB8A-4C06-85D8-208D50FC6B5D}"/>
+                  </a:ext>
+                </a:extLst>
+              </p:cNvPr>
+              <p:cNvSpPr txBox="1"/>
+              <p:nvPr/>
+            </p:nvSpPr>
+            <p:spPr>
+              <a:xfrm>
+                <a:off x="2947767" y="3803023"/>
+                <a:ext cx="1877052" cy="615810"/>
+              </a:xfrm>
+              <a:prstGeom prst="rect">
+                <a:avLst/>
+              </a:prstGeom>
+              <a:noFill/>
+            </p:spPr>
+            <p:txBody>
+              <a:bodyPr wrap="none" lIns="0" tIns="0" rIns="0" bIns="0" rtlCol="0">
+                <a:spAutoFit/>
+              </a:bodyPr>
+              <a:lstStyle/>
+              <a:p>
+                <a:pPr algn="ctr"/>
+                <a14:m>
+                  <m:oMathPara xmlns:m="http://schemas.openxmlformats.org/officeDocument/2006/math">
+                    <m:oMathParaPr>
+                      <m:jc m:val="centerGroup"/>
+                    </m:oMathParaPr>
+                    <m:oMath xmlns:m="http://schemas.openxmlformats.org/officeDocument/2006/math">
+                      <m:sSub>
+                        <m:sSubPr>
+                          <m:ctrlPr>
+                            <a:rPr kumimoji="1" lang="en-US" altLang="ja-JP" sz="2400" b="1" i="1" smtClean="0">
+                              <a:solidFill>
+                                <a:srgbClr val="212733"/>
+                              </a:solidFill>
+                              <a:latin typeface="Cambria Math" panose="02040503050406030204" pitchFamily="18" charset="0"/>
+                              <a:ea typeface="+mn-ea"/>
+                              <a:cs typeface="Arial" panose="020B0604020202020204" pitchFamily="34" charset="0"/>
+                            </a:rPr>
+                          </m:ctrlPr>
+                        </m:sSubPr>
+                        <m:e>
+                          <m:r>
+                            <m:rPr>
+                              <m:nor/>
+                            </m:rPr>
+                            <a:rPr kumimoji="1" lang="en-US" altLang="ja-JP" sz="2400" b="1" i="0" smtClean="0">
+                              <a:solidFill>
+                                <a:srgbClr val="212733"/>
+                              </a:solidFill>
+                              <a:latin typeface="Cambria Math" panose="02040503050406030204" pitchFamily="18" charset="0"/>
+                              <a:ea typeface="+mn-ea"/>
+                              <a:cs typeface="Arial" panose="020B0604020202020204" pitchFamily="34" charset="0"/>
+                            </a:rPr>
+                            <m:t>T</m:t>
+                          </m:r>
+                        </m:e>
+                        <m:sub>
+                          <m:r>
+                            <a:rPr kumimoji="1" lang="en-US" altLang="ja-JP" sz="2400" b="0" i="1" smtClean="0">
+                              <a:solidFill>
+                                <a:srgbClr val="212733"/>
+                              </a:solidFill>
+                              <a:latin typeface="Cambria Math" panose="02040503050406030204" pitchFamily="18" charset="0"/>
+                              <a:ea typeface="+mn-ea"/>
+                              <a:cs typeface="Arial" panose="020B0604020202020204" pitchFamily="34" charset="0"/>
+                            </a:rPr>
+                            <m:t>𝑟</m:t>
+                          </m:r>
+                        </m:sub>
+                      </m:sSub>
+                      <m:r>
+                        <a:rPr kumimoji="1" lang="en-US" altLang="ja-JP" sz="2400" i="1" smtClean="0">
+                          <a:solidFill>
+                            <a:srgbClr val="212733"/>
+                          </a:solidFill>
+                          <a:latin typeface="Cambria Math" panose="02040503050406030204" pitchFamily="18" charset="0"/>
+                          <a:ea typeface="+mn-ea"/>
+                          <a:cs typeface="Arial" panose="020B0604020202020204" pitchFamily="34" charset="0"/>
+                        </a:rPr>
+                        <m:t>=</m:t>
+                      </m:r>
+                      <m:r>
+                        <a:rPr kumimoji="1" lang="en-US" altLang="ja-JP" sz="2400" b="0" i="1" smtClean="0">
+                          <a:solidFill>
+                            <a:srgbClr val="212733"/>
+                          </a:solidFill>
+                          <a:latin typeface="Cambria Math" panose="02040503050406030204" pitchFamily="18" charset="0"/>
+                          <a:ea typeface="+mn-ea"/>
+                          <a:cs typeface="Arial" panose="020B0604020202020204" pitchFamily="34" charset="0"/>
+                        </a:rPr>
+                        <m:t>𝑎</m:t>
+                      </m:r>
+                      <m:d>
+                        <m:dPr>
+                          <m:begChr m:val="["/>
+                          <m:endChr m:val="]"/>
+                          <m:ctrlPr>
+                            <a:rPr kumimoji="1" lang="en-US" altLang="ja-JP" sz="2400" i="1" smtClean="0">
+                              <a:solidFill>
+                                <a:srgbClr val="212733"/>
+                              </a:solidFill>
+                              <a:latin typeface="Cambria Math" panose="02040503050406030204" pitchFamily="18" charset="0"/>
+                              <a:ea typeface="+mn-ea"/>
+                              <a:cs typeface="Arial" panose="020B0604020202020204" pitchFamily="34" charset="0"/>
+                            </a:rPr>
+                          </m:ctrlPr>
+                        </m:dPr>
+                        <m:e>
+                          <m:m>
+                            <m:mPr>
+                              <m:mcs>
+                                <m:mc>
+                                  <m:mcPr>
+                                    <m:count m:val="2"/>
+                                    <m:mcJc m:val="center"/>
+                                  </m:mcPr>
+                                </m:mc>
+                              </m:mcs>
+                              <m:ctrlPr>
+                                <a:rPr kumimoji="1" lang="en-US" altLang="ja-JP" sz="2400" i="1" smtClean="0">
+                                  <a:solidFill>
+                                    <a:srgbClr val="212733"/>
+                                  </a:solidFill>
+                                  <a:latin typeface="Cambria Math" panose="02040503050406030204" pitchFamily="18" charset="0"/>
+                                  <a:ea typeface="+mn-ea"/>
+                                  <a:cs typeface="Arial" panose="020B0604020202020204" pitchFamily="34" charset="0"/>
+                                </a:rPr>
+                              </m:ctrlPr>
+                            </m:mPr>
+                            <m:mr>
+                              <m:e>
+                                <m:r>
+                                  <m:rPr>
+                                    <m:brk m:alnAt="7"/>
+                                  </m:rPr>
+                                  <a:rPr kumimoji="1" lang="en-US" altLang="ja-JP" sz="2400" b="0" i="1" smtClean="0">
+                                    <a:solidFill>
+                                      <a:srgbClr val="212733"/>
+                                    </a:solidFill>
+                                    <a:latin typeface="Cambria Math" panose="02040503050406030204" pitchFamily="18" charset="0"/>
+                                    <a:ea typeface="+mn-ea"/>
+                                    <a:cs typeface="Arial" panose="020B0604020202020204" pitchFamily="34" charset="0"/>
+                                  </a:rPr>
+                                  <m:t>1</m:t>
+                                </m:r>
+                              </m:e>
+                              <m:e>
+                                <m:r>
+                                  <a:rPr kumimoji="1" lang="en-US" altLang="ja-JP" sz="2400" b="0" i="1" smtClean="0">
+                                    <a:solidFill>
+                                      <a:srgbClr val="212733"/>
+                                    </a:solidFill>
+                                    <a:latin typeface="Cambria Math" panose="02040503050406030204" pitchFamily="18" charset="0"/>
+                                    <a:ea typeface="+mn-ea"/>
+                                    <a:cs typeface="Arial" panose="020B0604020202020204" pitchFamily="34" charset="0"/>
+                                  </a:rPr>
+                                  <m:t>0</m:t>
+                                </m:r>
+                              </m:e>
+                            </m:mr>
+                            <m:mr>
+                              <m:e>
+                                <m:r>
+                                  <a:rPr kumimoji="1" lang="en-US" altLang="ja-JP" sz="2400" b="0" i="1" smtClean="0">
+                                    <a:solidFill>
+                                      <a:srgbClr val="212733"/>
+                                    </a:solidFill>
+                                    <a:latin typeface="Cambria Math" panose="02040503050406030204" pitchFamily="18" charset="0"/>
+                                    <a:ea typeface="+mn-ea"/>
+                                    <a:cs typeface="Arial" panose="020B0604020202020204" pitchFamily="34" charset="0"/>
+                                  </a:rPr>
+                                  <m:t>0</m:t>
+                                </m:r>
+                              </m:e>
+                              <m:e>
+                                <m:r>
+                                  <a:rPr kumimoji="1" lang="en-US" altLang="ja-JP" sz="2400" b="0" i="1" smtClean="0">
+                                    <a:solidFill>
+                                      <a:srgbClr val="212733"/>
+                                    </a:solidFill>
+                                    <a:latin typeface="Cambria Math" panose="02040503050406030204" pitchFamily="18" charset="0"/>
+                                    <a:ea typeface="+mn-ea"/>
+                                    <a:cs typeface="Arial" panose="020B0604020202020204" pitchFamily="34" charset="0"/>
+                                  </a:rPr>
+                                  <m:t>1</m:t>
+                                </m:r>
+                              </m:e>
+                            </m:mr>
+                          </m:m>
+                        </m:e>
+                      </m:d>
+                    </m:oMath>
+                  </m:oMathPara>
+                </a14:m>
+                <a:endParaRPr kumimoji="1" lang="ja-JP" altLang="en-US" sz="2400" dirty="0">
+                  <a:solidFill>
+                    <a:srgbClr val="212733"/>
+                  </a:solidFill>
+                  <a:latin typeface="+mn-lt"/>
+                  <a:ea typeface="+mn-ea"/>
+                  <a:cs typeface="Arial" panose="020B0604020202020204" pitchFamily="34" charset="0"/>
+                </a:endParaRPr>
+              </a:p>
+            </p:txBody>
+          </p:sp>
+        </mc:Choice>
+        <mc:Fallback>
+          <p:sp>
+            <p:nvSpPr>
+              <p:cNvPr id="19" name="TextBox 18">
+                <a:extLst>
+                  <a:ext uri="{FF2B5EF4-FFF2-40B4-BE49-F238E27FC236}">
+                    <a16:creationId xmlns:a16="http://schemas.microsoft.com/office/drawing/2014/main" id="{A6C2E9B3-EB8A-4C06-85D8-208D50FC6B5D}"/>
+                  </a:ext>
+                </a:extLst>
+              </p:cNvPr>
+              <p:cNvSpPr txBox="1">
+                <a:spLocks noRot="1" noChangeAspect="1" noMove="1" noResize="1" noEditPoints="1" noAdjustHandles="1" noChangeArrowheads="1" noChangeShapeType="1" noTextEdit="1"/>
+              </p:cNvSpPr>
+              <p:nvPr/>
+            </p:nvSpPr>
+            <p:spPr>
+              <a:xfrm>
+                <a:off x="2947767" y="3803023"/>
+                <a:ext cx="1877052" cy="615810"/>
+              </a:xfrm>
+              <a:prstGeom prst="rect">
+                <a:avLst/>
+              </a:prstGeom>
+              <a:blipFill>
+                <a:blip r:embed="rId7"/>
+                <a:stretch>
+                  <a:fillRect/>
+                </a:stretch>
+              </a:blipFill>
+            </p:spPr>
+            <p:txBody>
+              <a:bodyPr/>
+              <a:lstStyle/>
+              <a:p>
+                <a:r>
+                  <a:rPr lang="ja-JP" altLang="en-US">
+                    <a:noFill/>
+                  </a:rPr>
+                  <a:t> </a:t>
+                </a:r>
+              </a:p>
+            </p:txBody>
+          </p:sp>
+        </mc:Fallback>
+      </mc:AlternateContent>
+      <p:sp>
+        <p:nvSpPr>
+          <p:cNvPr id="22" name="TextBox 21">
+            <a:extLst>
+              <a:ext uri="{FF2B5EF4-FFF2-40B4-BE49-F238E27FC236}">
+                <a16:creationId xmlns:a16="http://schemas.microsoft.com/office/drawing/2014/main" id="{3CEC45C9-D7CE-42F7-B315-A5CBCA7A19D4}"/>
+              </a:ext>
+            </a:extLst>
+          </p:cNvPr>
+          <p:cNvSpPr txBox="1"/>
+          <p:nvPr/>
+        </p:nvSpPr>
+        <p:spPr>
+          <a:xfrm>
+            <a:off x="2644183" y="3398998"/>
+            <a:ext cx="4769254" cy="461665"/>
+          </a:xfrm>
+          <a:prstGeom prst="rect">
+            <a:avLst/>
+          </a:prstGeom>
+          <a:noFill/>
+        </p:spPr>
+        <p:txBody>
+          <a:bodyPr wrap="none" rtlCol="0">
+            <a:spAutoFit/>
+          </a:bodyPr>
+          <a:lstStyle/>
+          <a:p>
+            <a:r>
+              <a:rPr kumimoji="1" lang="en-US" altLang="ja-JP" sz="2400" dirty="0">
+                <a:solidFill>
+                  <a:srgbClr val="212733"/>
+                </a:solidFill>
+                <a:latin typeface="+mn-lt"/>
+                <a:ea typeface="+mn-ea"/>
+                <a:cs typeface="Arial" panose="020B0604020202020204" pitchFamily="34" charset="0"/>
+              </a:rPr>
+              <a:t>For small scatters, backscattering</a:t>
+            </a:r>
+            <a:endParaRPr kumimoji="1" lang="ja-JP" altLang="en-US" sz="2400" dirty="0">
+              <a:solidFill>
+                <a:srgbClr val="212733"/>
+              </a:solidFill>
+              <a:latin typeface="+mn-lt"/>
+              <a:ea typeface="+mn-ea"/>
+              <a:cs typeface="Arial" panose="020B0604020202020204" pitchFamily="34" charset="0"/>
+            </a:endParaRPr>
+          </a:p>
+        </p:txBody>
+      </p:sp>
+      <mc:AlternateContent xmlns:mc="http://schemas.openxmlformats.org/markup-compatibility/2006">
+        <mc:Choice xmlns:a14="http://schemas.microsoft.com/office/drawing/2010/main" Requires="a14">
+          <p:sp>
+            <p:nvSpPr>
+              <p:cNvPr id="23" name="TextBox 22">
+                <a:extLst>
+                  <a:ext uri="{FF2B5EF4-FFF2-40B4-BE49-F238E27FC236}">
+                    <a16:creationId xmlns:a16="http://schemas.microsoft.com/office/drawing/2014/main" id="{6DB5BBB5-FDA9-4AB2-AE78-BD857BA13FEE}"/>
+                  </a:ext>
+                </a:extLst>
+              </p:cNvPr>
+              <p:cNvSpPr txBox="1"/>
+              <p:nvPr/>
+            </p:nvSpPr>
+            <p:spPr>
+              <a:xfrm>
+                <a:off x="2934975" y="2532923"/>
+                <a:ext cx="1902636" cy="615810"/>
+              </a:xfrm>
+              <a:prstGeom prst="rect">
+                <a:avLst/>
+              </a:prstGeom>
+              <a:noFill/>
+            </p:spPr>
+            <p:txBody>
+              <a:bodyPr wrap="none" lIns="0" tIns="0" rIns="0" bIns="0" rtlCol="0">
+                <a:spAutoFit/>
+              </a:bodyPr>
+              <a:lstStyle/>
+              <a:p>
+                <a:pPr algn="ctr"/>
+                <a14:m>
+                  <m:oMathPara xmlns:m="http://schemas.openxmlformats.org/officeDocument/2006/math">
+                    <m:oMathParaPr>
+                      <m:jc m:val="centerGroup"/>
+                    </m:oMathParaPr>
+                    <m:oMath xmlns:m="http://schemas.openxmlformats.org/officeDocument/2006/math">
+                      <m:sSub>
+                        <m:sSubPr>
+                          <m:ctrlPr>
+                            <a:rPr kumimoji="1" lang="en-US" altLang="ja-JP" sz="2400" b="1" i="1" smtClean="0">
+                              <a:solidFill>
+                                <a:srgbClr val="212733"/>
+                              </a:solidFill>
+                              <a:latin typeface="Cambria Math" panose="02040503050406030204" pitchFamily="18" charset="0"/>
+                              <a:ea typeface="+mn-ea"/>
+                              <a:cs typeface="Arial" panose="020B0604020202020204" pitchFamily="34" charset="0"/>
+                            </a:rPr>
+                          </m:ctrlPr>
+                        </m:sSubPr>
+                        <m:e>
+                          <m:r>
+                            <m:rPr>
+                              <m:nor/>
+                            </m:rPr>
+                            <a:rPr lang="en-US" altLang="ja-JP" sz="2400" b="1" i="0" smtClean="0">
+                              <a:solidFill>
+                                <a:srgbClr val="212733"/>
+                              </a:solidFill>
+                              <a:latin typeface="Cambria Math" panose="02040503050406030204" pitchFamily="18" charset="0"/>
+                              <a:cs typeface="Arial" panose="020B0604020202020204" pitchFamily="34" charset="0"/>
+                            </a:rPr>
+                            <m:t>T</m:t>
+                          </m:r>
+                        </m:e>
+                        <m:sub>
+                          <m:r>
+                            <a:rPr kumimoji="1" lang="en-US" altLang="ja-JP" sz="2400" b="0" i="1" smtClean="0">
+                              <a:solidFill>
+                                <a:srgbClr val="212733"/>
+                              </a:solidFill>
+                              <a:latin typeface="Cambria Math" panose="02040503050406030204" pitchFamily="18" charset="0"/>
+                              <a:ea typeface="+mn-ea"/>
+                              <a:cs typeface="Arial" panose="020B0604020202020204" pitchFamily="34" charset="0"/>
+                            </a:rPr>
+                            <m:t>𝑟</m:t>
+                          </m:r>
+                        </m:sub>
+                      </m:sSub>
+                      <m:r>
+                        <a:rPr kumimoji="1" lang="en-US" altLang="ja-JP" sz="2400" i="1" smtClean="0">
+                          <a:solidFill>
+                            <a:srgbClr val="212733"/>
+                          </a:solidFill>
+                          <a:latin typeface="Cambria Math" panose="02040503050406030204" pitchFamily="18" charset="0"/>
+                          <a:ea typeface="+mn-ea"/>
+                          <a:cs typeface="Arial" panose="020B0604020202020204" pitchFamily="34" charset="0"/>
+                        </a:rPr>
+                        <m:t>=</m:t>
+                      </m:r>
+                      <m:r>
+                        <a:rPr kumimoji="1" lang="en-US" altLang="ja-JP" sz="2400" b="0" i="1" smtClean="0">
+                          <a:solidFill>
+                            <a:srgbClr val="212733"/>
+                          </a:solidFill>
+                          <a:latin typeface="Cambria Math" panose="02040503050406030204" pitchFamily="18" charset="0"/>
+                          <a:ea typeface="+mn-ea"/>
+                          <a:cs typeface="Arial" panose="020B0604020202020204" pitchFamily="34" charset="0"/>
+                        </a:rPr>
+                        <m:t>𝑅</m:t>
+                      </m:r>
+                      <m:d>
+                        <m:dPr>
+                          <m:begChr m:val="["/>
+                          <m:endChr m:val="]"/>
+                          <m:ctrlPr>
+                            <a:rPr kumimoji="1" lang="en-US" altLang="ja-JP" sz="2400" i="1" smtClean="0">
+                              <a:solidFill>
+                                <a:srgbClr val="212733"/>
+                              </a:solidFill>
+                              <a:latin typeface="Cambria Math" panose="02040503050406030204" pitchFamily="18" charset="0"/>
+                              <a:ea typeface="+mn-ea"/>
+                              <a:cs typeface="Arial" panose="020B0604020202020204" pitchFamily="34" charset="0"/>
+                            </a:rPr>
+                          </m:ctrlPr>
+                        </m:dPr>
+                        <m:e>
+                          <m:m>
+                            <m:mPr>
+                              <m:mcs>
+                                <m:mc>
+                                  <m:mcPr>
+                                    <m:count m:val="2"/>
+                                    <m:mcJc m:val="center"/>
+                                  </m:mcPr>
+                                </m:mc>
+                              </m:mcs>
+                              <m:ctrlPr>
+                                <a:rPr kumimoji="1" lang="en-US" altLang="ja-JP" sz="2400" i="1" smtClean="0">
+                                  <a:solidFill>
+                                    <a:srgbClr val="212733"/>
+                                  </a:solidFill>
+                                  <a:latin typeface="Cambria Math" panose="02040503050406030204" pitchFamily="18" charset="0"/>
+                                  <a:ea typeface="+mn-ea"/>
+                                  <a:cs typeface="Arial" panose="020B0604020202020204" pitchFamily="34" charset="0"/>
+                                </a:rPr>
+                              </m:ctrlPr>
+                            </m:mPr>
+                            <m:mr>
+                              <m:e>
+                                <m:r>
+                                  <m:rPr>
+                                    <m:brk m:alnAt="7"/>
+                                  </m:rPr>
+                                  <a:rPr kumimoji="1" lang="en-US" altLang="ja-JP" sz="2400" b="0" i="1" smtClean="0">
+                                    <a:solidFill>
+                                      <a:srgbClr val="212733"/>
+                                    </a:solidFill>
+                                    <a:latin typeface="Cambria Math" panose="02040503050406030204" pitchFamily="18" charset="0"/>
+                                    <a:ea typeface="+mn-ea"/>
+                                    <a:cs typeface="Arial" panose="020B0604020202020204" pitchFamily="34" charset="0"/>
+                                  </a:rPr>
+                                  <m:t>1</m:t>
+                                </m:r>
+                              </m:e>
+                              <m:e>
+                                <m:r>
+                                  <a:rPr kumimoji="1" lang="en-US" altLang="ja-JP" sz="2400" b="0" i="1" smtClean="0">
+                                    <a:solidFill>
+                                      <a:srgbClr val="212733"/>
+                                    </a:solidFill>
+                                    <a:latin typeface="Cambria Math" panose="02040503050406030204" pitchFamily="18" charset="0"/>
+                                    <a:ea typeface="+mn-ea"/>
+                                    <a:cs typeface="Arial" panose="020B0604020202020204" pitchFamily="34" charset="0"/>
+                                  </a:rPr>
+                                  <m:t>0</m:t>
+                                </m:r>
+                              </m:e>
+                            </m:mr>
+                            <m:mr>
+                              <m:e>
+                                <m:r>
+                                  <a:rPr kumimoji="1" lang="en-US" altLang="ja-JP" sz="2400" b="0" i="1" smtClean="0">
+                                    <a:solidFill>
+                                      <a:srgbClr val="212733"/>
+                                    </a:solidFill>
+                                    <a:latin typeface="Cambria Math" panose="02040503050406030204" pitchFamily="18" charset="0"/>
+                                    <a:ea typeface="+mn-ea"/>
+                                    <a:cs typeface="Arial" panose="020B0604020202020204" pitchFamily="34" charset="0"/>
+                                  </a:rPr>
+                                  <m:t>0</m:t>
+                                </m:r>
+                              </m:e>
+                              <m:e>
+                                <m:r>
+                                  <a:rPr kumimoji="1" lang="en-US" altLang="ja-JP" sz="2400" b="0" i="1" smtClean="0">
+                                    <a:solidFill>
+                                      <a:srgbClr val="212733"/>
+                                    </a:solidFill>
+                                    <a:latin typeface="Cambria Math" panose="02040503050406030204" pitchFamily="18" charset="0"/>
+                                    <a:ea typeface="+mn-ea"/>
+                                    <a:cs typeface="Arial" panose="020B0604020202020204" pitchFamily="34" charset="0"/>
+                                  </a:rPr>
+                                  <m:t>1</m:t>
+                                </m:r>
+                              </m:e>
+                            </m:mr>
+                          </m:m>
+                        </m:e>
+                      </m:d>
+                    </m:oMath>
+                  </m:oMathPara>
+                </a14:m>
+                <a:endParaRPr kumimoji="1" lang="ja-JP" altLang="en-US" sz="2400" dirty="0">
+                  <a:solidFill>
+                    <a:srgbClr val="212733"/>
+                  </a:solidFill>
+                  <a:latin typeface="+mn-lt"/>
+                  <a:ea typeface="+mn-ea"/>
+                  <a:cs typeface="Arial" panose="020B0604020202020204" pitchFamily="34" charset="0"/>
+                </a:endParaRPr>
+              </a:p>
+            </p:txBody>
+          </p:sp>
+        </mc:Choice>
+        <mc:Fallback>
+          <p:sp>
+            <p:nvSpPr>
+              <p:cNvPr id="23" name="TextBox 22">
+                <a:extLst>
+                  <a:ext uri="{FF2B5EF4-FFF2-40B4-BE49-F238E27FC236}">
+                    <a16:creationId xmlns:a16="http://schemas.microsoft.com/office/drawing/2014/main" id="{6DB5BBB5-FDA9-4AB2-AE78-BD857BA13FEE}"/>
+                  </a:ext>
+                </a:extLst>
+              </p:cNvPr>
+              <p:cNvSpPr txBox="1">
+                <a:spLocks noRot="1" noChangeAspect="1" noMove="1" noResize="1" noEditPoints="1" noAdjustHandles="1" noChangeArrowheads="1" noChangeShapeType="1" noTextEdit="1"/>
+              </p:cNvSpPr>
+              <p:nvPr/>
+            </p:nvSpPr>
+            <p:spPr>
+              <a:xfrm>
+                <a:off x="2934975" y="2532923"/>
+                <a:ext cx="1902636" cy="615810"/>
+              </a:xfrm>
+              <a:prstGeom prst="rect">
+                <a:avLst/>
+              </a:prstGeom>
+              <a:blipFill>
+                <a:blip r:embed="rId8"/>
+                <a:stretch>
+                  <a:fillRect/>
+                </a:stretch>
+              </a:blipFill>
+            </p:spPr>
+            <p:txBody>
+              <a:bodyPr/>
+              <a:lstStyle/>
+              <a:p>
+                <a:r>
+                  <a:rPr lang="ja-JP" altLang="en-US">
+                    <a:noFill/>
+                  </a:rPr>
+                  <a:t> </a:t>
+                </a:r>
+              </a:p>
+            </p:txBody>
+          </p:sp>
+        </mc:Fallback>
+      </mc:AlternateContent>
+      <p:sp>
+        <p:nvSpPr>
+          <p:cNvPr id="24" name="TextBox 23">
+            <a:extLst>
+              <a:ext uri="{FF2B5EF4-FFF2-40B4-BE49-F238E27FC236}">
+                <a16:creationId xmlns:a16="http://schemas.microsoft.com/office/drawing/2014/main" id="{20B1D033-B901-48C7-91BC-0E9CB5CE1B00}"/>
+              </a:ext>
+            </a:extLst>
+          </p:cNvPr>
+          <p:cNvSpPr txBox="1"/>
+          <p:nvPr/>
+        </p:nvSpPr>
+        <p:spPr>
+          <a:xfrm>
+            <a:off x="2655457" y="2085823"/>
+            <a:ext cx="2717411" cy="461665"/>
+          </a:xfrm>
+          <a:prstGeom prst="rect">
+            <a:avLst/>
+          </a:prstGeom>
+          <a:noFill/>
+        </p:spPr>
+        <p:txBody>
+          <a:bodyPr wrap="none" rtlCol="0">
+            <a:spAutoFit/>
+          </a:bodyPr>
+          <a:lstStyle/>
+          <a:p>
+            <a:r>
+              <a:rPr kumimoji="1" lang="en-US" altLang="ja-JP" sz="2400" dirty="0">
+                <a:solidFill>
+                  <a:srgbClr val="212733"/>
+                </a:solidFill>
+                <a:latin typeface="+mn-lt"/>
+                <a:ea typeface="+mn-ea"/>
+                <a:cs typeface="Arial" panose="020B0604020202020204" pitchFamily="34" charset="0"/>
+              </a:rPr>
+              <a:t>For back reflection</a:t>
+            </a:r>
+            <a:endParaRPr kumimoji="1" lang="ja-JP" altLang="en-US" sz="2400" dirty="0">
+              <a:solidFill>
+                <a:srgbClr val="212733"/>
+              </a:solidFill>
+              <a:latin typeface="+mn-lt"/>
+              <a:ea typeface="+mn-ea"/>
+              <a:cs typeface="Arial" panose="020B0604020202020204" pitchFamily="34" charset="0"/>
+            </a:endParaRPr>
+          </a:p>
+        </p:txBody>
+      </p:sp>
+      <mc:AlternateContent xmlns:mc="http://schemas.openxmlformats.org/markup-compatibility/2006">
+        <mc:Choice xmlns:a14="http://schemas.microsoft.com/office/drawing/2010/main" Requires="a14">
+          <p:sp>
+            <p:nvSpPr>
+              <p:cNvPr id="25" name="TextBox 24">
+                <a:extLst>
+                  <a:ext uri="{FF2B5EF4-FFF2-40B4-BE49-F238E27FC236}">
+                    <a16:creationId xmlns:a16="http://schemas.microsoft.com/office/drawing/2014/main" id="{846EF55E-8424-4D5A-AB2F-1E535B0C709C}"/>
+                  </a:ext>
+                </a:extLst>
+              </p:cNvPr>
+              <p:cNvSpPr txBox="1"/>
+              <p:nvPr/>
+            </p:nvSpPr>
+            <p:spPr>
+              <a:xfrm>
+                <a:off x="2778543" y="4830977"/>
+                <a:ext cx="2974660" cy="1219501"/>
+              </a:xfrm>
+              <a:prstGeom prst="rect">
+                <a:avLst/>
+              </a:prstGeom>
+              <a:noFill/>
+            </p:spPr>
+            <p:txBody>
+              <a:bodyPr wrap="none" lIns="0" tIns="0" rIns="0" bIns="0" rtlCol="0">
+                <a:spAutoFit/>
+              </a:bodyPr>
+              <a:lstStyle/>
+              <a:p>
+                <a:pPr algn="ctr"/>
+                <a14:m>
+                  <m:oMathPara xmlns:m="http://schemas.openxmlformats.org/officeDocument/2006/math">
+                    <m:oMathParaPr>
+                      <m:jc m:val="centerGroup"/>
+                    </m:oMathParaPr>
+                    <m:oMath xmlns:m="http://schemas.openxmlformats.org/officeDocument/2006/math">
+                      <m:sSub>
+                        <m:sSubPr>
+                          <m:ctrlPr>
+                            <a:rPr kumimoji="1" lang="en-US" altLang="ja-JP" sz="2800" b="1" i="1" smtClean="0">
+                              <a:solidFill>
+                                <a:srgbClr val="212733"/>
+                              </a:solidFill>
+                              <a:latin typeface="Cambria Math" panose="02040503050406030204" pitchFamily="18" charset="0"/>
+                              <a:ea typeface="+mn-ea"/>
+                              <a:cs typeface="Arial" panose="020B0604020202020204" pitchFamily="34" charset="0"/>
+                            </a:rPr>
+                          </m:ctrlPr>
+                        </m:sSubPr>
+                        <m:e>
+                          <m:r>
+                            <m:rPr>
+                              <m:nor/>
+                            </m:rPr>
+                            <a:rPr kumimoji="1" lang="en-US" altLang="ja-JP" sz="2800" b="1" i="0" smtClean="0">
+                              <a:solidFill>
+                                <a:srgbClr val="212733"/>
+                              </a:solidFill>
+                              <a:latin typeface="Cambria Math" panose="02040503050406030204" pitchFamily="18" charset="0"/>
+                              <a:ea typeface="+mn-ea"/>
+                              <a:cs typeface="Arial" panose="020B0604020202020204" pitchFamily="34" charset="0"/>
+                            </a:rPr>
+                            <m:t>T</m:t>
+                          </m:r>
+                        </m:e>
+                        <m:sub>
+                          <m:r>
+                            <a:rPr kumimoji="1" lang="en-US" altLang="ja-JP" sz="2800" b="0" i="1" smtClean="0">
+                              <a:solidFill>
+                                <a:srgbClr val="212733"/>
+                              </a:solidFill>
+                              <a:latin typeface="Cambria Math" panose="02040503050406030204" pitchFamily="18" charset="0"/>
+                              <a:ea typeface="+mn-ea"/>
+                              <a:cs typeface="Arial" panose="020B0604020202020204" pitchFamily="34" charset="0"/>
+                            </a:rPr>
+                            <m:t>𝑎𝑙𝑙</m:t>
+                          </m:r>
+                        </m:sub>
+                      </m:sSub>
+                      <m:r>
+                        <a:rPr kumimoji="1" lang="en-US" altLang="ja-JP" sz="2800" i="1" smtClean="0">
+                          <a:solidFill>
+                            <a:srgbClr val="212733"/>
+                          </a:solidFill>
+                          <a:latin typeface="Cambria Math" panose="02040503050406030204" pitchFamily="18" charset="0"/>
+                          <a:ea typeface="Cambria Math" panose="02040503050406030204" pitchFamily="18" charset="0"/>
+                          <a:cs typeface="Arial" panose="020B0604020202020204" pitchFamily="34" charset="0"/>
+                        </a:rPr>
+                        <m:t>∝</m:t>
+                      </m:r>
+                      <m:sSubSup>
+                        <m:sSubSupPr>
+                          <m:ctrlPr>
+                            <a:rPr lang="en-US" altLang="ja-JP" sz="2800" i="1">
+                              <a:solidFill>
+                                <a:srgbClr val="212733"/>
+                              </a:solidFill>
+                              <a:latin typeface="Cambria Math" panose="02040503050406030204" pitchFamily="18" charset="0"/>
+                              <a:cs typeface="Arial" panose="020B0604020202020204" pitchFamily="34" charset="0"/>
+                            </a:rPr>
+                          </m:ctrlPr>
+                        </m:sSubSupPr>
+                        <m:e>
+                          <m:r>
+                            <m:rPr>
+                              <m:nor/>
+                            </m:rPr>
+                            <a:rPr lang="en-US" altLang="ja-JP" sz="2800" b="1" i="0" smtClean="0">
+                              <a:solidFill>
+                                <a:srgbClr val="212733"/>
+                              </a:solidFill>
+                              <a:latin typeface="Cambria Math" panose="02040503050406030204" pitchFamily="18" charset="0"/>
+                              <a:cs typeface="Arial" panose="020B0604020202020204" pitchFamily="34" charset="0"/>
+                            </a:rPr>
+                            <m:t>T</m:t>
+                          </m:r>
+                        </m:e>
+                        <m:sub>
+                          <m:r>
+                            <a:rPr lang="en-US" altLang="ja-JP" sz="2800" i="1">
+                              <a:solidFill>
+                                <a:srgbClr val="212733"/>
+                              </a:solidFill>
+                              <a:latin typeface="Cambria Math" panose="02040503050406030204" pitchFamily="18" charset="0"/>
+                              <a:cs typeface="Arial" panose="020B0604020202020204" pitchFamily="34" charset="0"/>
+                            </a:rPr>
+                            <m:t>𝑓</m:t>
+                          </m:r>
+                        </m:sub>
+                        <m:sup>
+                          <m:r>
+                            <a:rPr lang="en-US" altLang="ja-JP" sz="2800" i="1">
+                              <a:solidFill>
+                                <a:srgbClr val="212733"/>
+                              </a:solidFill>
+                              <a:latin typeface="Cambria Math" panose="02040503050406030204" pitchFamily="18" charset="0"/>
+                              <a:cs typeface="Arial" panose="020B0604020202020204" pitchFamily="34" charset="0"/>
+                            </a:rPr>
+                            <m:t>𝑇</m:t>
+                          </m:r>
+                        </m:sup>
+                      </m:sSubSup>
+                      <m:d>
+                        <m:dPr>
+                          <m:begChr m:val="["/>
+                          <m:endChr m:val="]"/>
+                          <m:ctrlPr>
+                            <a:rPr lang="en-US" altLang="ja-JP" sz="2800" i="1">
+                              <a:solidFill>
+                                <a:srgbClr val="212733"/>
+                              </a:solidFill>
+                              <a:latin typeface="Cambria Math" panose="02040503050406030204" pitchFamily="18" charset="0"/>
+                              <a:cs typeface="Arial" panose="020B0604020202020204" pitchFamily="34" charset="0"/>
+                            </a:rPr>
+                          </m:ctrlPr>
+                        </m:dPr>
+                        <m:e>
+                          <m:m>
+                            <m:mPr>
+                              <m:mcs>
+                                <m:mc>
+                                  <m:mcPr>
+                                    <m:count m:val="2"/>
+                                    <m:mcJc m:val="center"/>
+                                  </m:mcPr>
+                                </m:mc>
+                              </m:mcs>
+                              <m:ctrlPr>
+                                <a:rPr lang="en-US" altLang="ja-JP" sz="2800" i="1">
+                                  <a:solidFill>
+                                    <a:srgbClr val="212733"/>
+                                  </a:solidFill>
+                                  <a:latin typeface="Cambria Math" panose="02040503050406030204" pitchFamily="18" charset="0"/>
+                                  <a:cs typeface="Arial" panose="020B0604020202020204" pitchFamily="34" charset="0"/>
+                                </a:rPr>
+                              </m:ctrlPr>
+                            </m:mPr>
+                            <m:mr>
+                              <m:e>
+                                <m:r>
+                                  <m:rPr>
+                                    <m:brk m:alnAt="7"/>
+                                  </m:rPr>
+                                  <a:rPr lang="en-US" altLang="ja-JP" sz="2800" i="1">
+                                    <a:solidFill>
+                                      <a:srgbClr val="212733"/>
+                                    </a:solidFill>
+                                    <a:latin typeface="Cambria Math" panose="02040503050406030204" pitchFamily="18" charset="0"/>
+                                    <a:cs typeface="Arial" panose="020B0604020202020204" pitchFamily="34" charset="0"/>
+                                  </a:rPr>
+                                  <m:t>1</m:t>
+                                </m:r>
+                              </m:e>
+                              <m:e>
+                                <m:r>
+                                  <a:rPr lang="en-US" altLang="ja-JP" sz="2800" i="1">
+                                    <a:solidFill>
+                                      <a:srgbClr val="212733"/>
+                                    </a:solidFill>
+                                    <a:latin typeface="Cambria Math" panose="02040503050406030204" pitchFamily="18" charset="0"/>
+                                    <a:cs typeface="Arial" panose="020B0604020202020204" pitchFamily="34" charset="0"/>
+                                  </a:rPr>
+                                  <m:t>0</m:t>
+                                </m:r>
+                              </m:e>
+                            </m:mr>
+                            <m:mr>
+                              <m:e>
+                                <m:r>
+                                  <a:rPr lang="en-US" altLang="ja-JP" sz="2800" i="1">
+                                    <a:solidFill>
+                                      <a:srgbClr val="212733"/>
+                                    </a:solidFill>
+                                    <a:latin typeface="Cambria Math" panose="02040503050406030204" pitchFamily="18" charset="0"/>
+                                    <a:cs typeface="Arial" panose="020B0604020202020204" pitchFamily="34" charset="0"/>
+                                  </a:rPr>
+                                  <m:t>0</m:t>
+                                </m:r>
+                              </m:e>
+                              <m:e>
+                                <m:r>
+                                  <a:rPr lang="en-US" altLang="ja-JP" sz="2800" i="1">
+                                    <a:solidFill>
+                                      <a:srgbClr val="212733"/>
+                                    </a:solidFill>
+                                    <a:latin typeface="Cambria Math" panose="02040503050406030204" pitchFamily="18" charset="0"/>
+                                    <a:cs typeface="Arial" panose="020B0604020202020204" pitchFamily="34" charset="0"/>
+                                  </a:rPr>
+                                  <m:t>1</m:t>
+                                </m:r>
+                              </m:e>
+                            </m:mr>
+                          </m:m>
+                        </m:e>
+                      </m:d>
+                      <m:sSub>
+                        <m:sSubPr>
+                          <m:ctrlPr>
+                            <a:rPr kumimoji="1" lang="en-US" altLang="ja-JP" sz="2800" i="1" smtClean="0">
+                              <a:solidFill>
+                                <a:srgbClr val="212733"/>
+                              </a:solidFill>
+                              <a:latin typeface="Cambria Math" panose="02040503050406030204" pitchFamily="18" charset="0"/>
+                              <a:ea typeface="+mn-ea"/>
+                              <a:cs typeface="Arial" panose="020B0604020202020204" pitchFamily="34" charset="0"/>
+                            </a:rPr>
+                          </m:ctrlPr>
+                        </m:sSubPr>
+                        <m:e>
+                          <m:r>
+                            <m:rPr>
+                              <m:nor/>
+                            </m:rPr>
+                            <a:rPr kumimoji="1" lang="en-US" altLang="ja-JP" sz="2800" b="1" i="0" smtClean="0">
+                              <a:solidFill>
+                                <a:srgbClr val="212733"/>
+                              </a:solidFill>
+                              <a:latin typeface="Cambria Math" panose="02040503050406030204" pitchFamily="18" charset="0"/>
+                              <a:ea typeface="+mn-ea"/>
+                              <a:cs typeface="Arial" panose="020B0604020202020204" pitchFamily="34" charset="0"/>
+                            </a:rPr>
+                            <m:t>T</m:t>
+                          </m:r>
+                        </m:e>
+                        <m:sub>
+                          <m:r>
+                            <a:rPr kumimoji="1" lang="en-US" altLang="ja-JP" sz="2800" b="0" i="1" smtClean="0">
+                              <a:solidFill>
+                                <a:srgbClr val="212733"/>
+                              </a:solidFill>
+                              <a:latin typeface="Cambria Math" panose="02040503050406030204" pitchFamily="18" charset="0"/>
+                              <a:ea typeface="+mn-ea"/>
+                              <a:cs typeface="Arial" panose="020B0604020202020204" pitchFamily="34" charset="0"/>
+                            </a:rPr>
+                            <m:t>𝑓</m:t>
+                          </m:r>
+                        </m:sub>
+                      </m:sSub>
+                    </m:oMath>
+                  </m:oMathPara>
+                </a14:m>
+                <a:endParaRPr kumimoji="1" lang="en-US" altLang="ja-JP" sz="2800" dirty="0">
+                  <a:solidFill>
+                    <a:srgbClr val="212733"/>
+                  </a:solidFill>
+                  <a:latin typeface="+mn-lt"/>
+                  <a:ea typeface="+mn-ea"/>
+                  <a:cs typeface="Arial" panose="020B0604020202020204" pitchFamily="34" charset="0"/>
+                </a:endParaRPr>
+              </a:p>
+              <a:p>
+                <a:pPr algn="ctr"/>
+                <a:r>
+                  <a:rPr kumimoji="1" lang="en-US" altLang="ja-JP" sz="2800" dirty="0">
+                    <a:solidFill>
+                      <a:srgbClr val="212733"/>
+                    </a:solidFill>
+                    <a:latin typeface="+mn-lt"/>
+                    <a:ea typeface="+mn-ea"/>
+                    <a:cs typeface="Arial" panose="020B0604020202020204" pitchFamily="34" charset="0"/>
+                  </a:rPr>
+                  <a:t>=</a:t>
+                </a:r>
+                <a:r>
+                  <a:rPr lang="en-US" altLang="ja-JP" sz="2800" dirty="0">
+                    <a:solidFill>
+                      <a:srgbClr val="212733"/>
+                    </a:solidFill>
+                    <a:cs typeface="Arial" panose="020B0604020202020204" pitchFamily="34" charset="0"/>
+                  </a:rPr>
+                  <a:t> </a:t>
+                </a:r>
+                <a14:m>
+                  <m:oMath xmlns:m="http://schemas.openxmlformats.org/officeDocument/2006/math">
+                    <m:sSubSup>
+                      <m:sSubSupPr>
+                        <m:ctrlPr>
+                          <a:rPr lang="en-US" altLang="ja-JP" sz="2800" i="1">
+                            <a:solidFill>
+                              <a:srgbClr val="212733"/>
+                            </a:solidFill>
+                            <a:latin typeface="Cambria Math" panose="02040503050406030204" pitchFamily="18" charset="0"/>
+                            <a:cs typeface="Arial" panose="020B0604020202020204" pitchFamily="34" charset="0"/>
+                          </a:rPr>
+                        </m:ctrlPr>
+                      </m:sSubSupPr>
+                      <m:e>
+                        <m:r>
+                          <m:rPr>
+                            <m:nor/>
+                          </m:rPr>
+                          <a:rPr lang="en-US" altLang="ja-JP" sz="2800" b="1" i="0" smtClean="0">
+                            <a:solidFill>
+                              <a:srgbClr val="212733"/>
+                            </a:solidFill>
+                            <a:latin typeface="Cambria Math" panose="02040503050406030204" pitchFamily="18" charset="0"/>
+                            <a:cs typeface="Arial" panose="020B0604020202020204" pitchFamily="34" charset="0"/>
+                          </a:rPr>
+                          <m:t>T</m:t>
+                        </m:r>
+                      </m:e>
+                      <m:sub>
+                        <m:r>
+                          <a:rPr lang="en-US" altLang="ja-JP" sz="2800" i="1">
+                            <a:solidFill>
+                              <a:srgbClr val="212733"/>
+                            </a:solidFill>
+                            <a:latin typeface="Cambria Math" panose="02040503050406030204" pitchFamily="18" charset="0"/>
+                            <a:cs typeface="Arial" panose="020B0604020202020204" pitchFamily="34" charset="0"/>
+                          </a:rPr>
+                          <m:t>𝑓</m:t>
+                        </m:r>
+                      </m:sub>
+                      <m:sup>
+                        <m:r>
+                          <a:rPr lang="en-US" altLang="ja-JP" sz="2800" i="1">
+                            <a:solidFill>
+                              <a:srgbClr val="212733"/>
+                            </a:solidFill>
+                            <a:latin typeface="Cambria Math" panose="02040503050406030204" pitchFamily="18" charset="0"/>
+                            <a:cs typeface="Arial" panose="020B0604020202020204" pitchFamily="34" charset="0"/>
+                          </a:rPr>
+                          <m:t>𝑇</m:t>
+                        </m:r>
+                      </m:sup>
+                    </m:sSubSup>
+                    <m:sSub>
+                      <m:sSubPr>
+                        <m:ctrlPr>
+                          <a:rPr kumimoji="1" lang="en-US" altLang="ja-JP" sz="2800" i="1" smtClean="0">
+                            <a:solidFill>
+                              <a:srgbClr val="212733"/>
+                            </a:solidFill>
+                            <a:latin typeface="Cambria Math" panose="02040503050406030204" pitchFamily="18" charset="0"/>
+                            <a:ea typeface="+mn-ea"/>
+                            <a:cs typeface="Arial" panose="020B0604020202020204" pitchFamily="34" charset="0"/>
+                          </a:rPr>
+                        </m:ctrlPr>
+                      </m:sSubPr>
+                      <m:e>
+                        <m:r>
+                          <m:rPr>
+                            <m:nor/>
+                          </m:rPr>
+                          <a:rPr kumimoji="1" lang="en-US" altLang="ja-JP" sz="2800" b="1" i="0" smtClean="0">
+                            <a:solidFill>
+                              <a:srgbClr val="212733"/>
+                            </a:solidFill>
+                            <a:latin typeface="Cambria Math" panose="02040503050406030204" pitchFamily="18" charset="0"/>
+                            <a:ea typeface="+mn-ea"/>
+                            <a:cs typeface="Arial" panose="020B0604020202020204" pitchFamily="34" charset="0"/>
+                          </a:rPr>
+                          <m:t>T</m:t>
+                        </m:r>
+                      </m:e>
+                      <m:sub>
+                        <m:r>
+                          <a:rPr kumimoji="1" lang="en-US" altLang="ja-JP" sz="2800" b="0" i="1" smtClean="0">
+                            <a:solidFill>
+                              <a:srgbClr val="212733"/>
+                            </a:solidFill>
+                            <a:latin typeface="Cambria Math" panose="02040503050406030204" pitchFamily="18" charset="0"/>
+                            <a:ea typeface="+mn-ea"/>
+                            <a:cs typeface="Arial" panose="020B0604020202020204" pitchFamily="34" charset="0"/>
+                          </a:rPr>
+                          <m:t>𝑓</m:t>
+                        </m:r>
+                      </m:sub>
+                    </m:sSub>
+                  </m:oMath>
+                </a14:m>
+                <a:endParaRPr kumimoji="1" lang="ja-JP" altLang="en-US" sz="2800" dirty="0">
+                  <a:solidFill>
+                    <a:srgbClr val="212733"/>
+                  </a:solidFill>
+                  <a:latin typeface="+mn-lt"/>
+                  <a:ea typeface="+mn-ea"/>
+                  <a:cs typeface="Arial" panose="020B0604020202020204" pitchFamily="34" charset="0"/>
+                </a:endParaRPr>
+              </a:p>
+            </p:txBody>
+          </p:sp>
+        </mc:Choice>
+        <mc:Fallback>
+          <p:sp>
+            <p:nvSpPr>
+              <p:cNvPr id="25" name="TextBox 24">
+                <a:extLst>
+                  <a:ext uri="{FF2B5EF4-FFF2-40B4-BE49-F238E27FC236}">
+                    <a16:creationId xmlns:a16="http://schemas.microsoft.com/office/drawing/2014/main" id="{846EF55E-8424-4D5A-AB2F-1E535B0C709C}"/>
+                  </a:ext>
+                </a:extLst>
+              </p:cNvPr>
+              <p:cNvSpPr txBox="1">
+                <a:spLocks noRot="1" noChangeAspect="1" noMove="1" noResize="1" noEditPoints="1" noAdjustHandles="1" noChangeArrowheads="1" noChangeShapeType="1" noTextEdit="1"/>
+              </p:cNvSpPr>
+              <p:nvPr/>
+            </p:nvSpPr>
+            <p:spPr>
+              <a:xfrm>
+                <a:off x="2778543" y="4830977"/>
+                <a:ext cx="2974660" cy="1219501"/>
+              </a:xfrm>
+              <a:prstGeom prst="rect">
+                <a:avLst/>
+              </a:prstGeom>
+              <a:blipFill>
+                <a:blip r:embed="rId9"/>
+                <a:stretch>
+                  <a:fillRect b="-11940"/>
+                </a:stretch>
+              </a:blipFill>
+            </p:spPr>
+            <p:txBody>
+              <a:bodyPr/>
+              <a:lstStyle/>
+              <a:p>
+                <a:r>
+                  <a:rPr lang="ja-JP" altLang="en-US">
+                    <a:noFill/>
+                  </a:rPr>
+                  <a:t> </a:t>
+                </a:r>
+              </a:p>
+            </p:txBody>
+          </p:sp>
+        </mc:Fallback>
+      </mc:AlternateContent>
+      <mc:AlternateContent xmlns:mc="http://schemas.openxmlformats.org/markup-compatibility/2006">
+        <mc:Choice xmlns:a14="http://schemas.microsoft.com/office/drawing/2010/main" Requires="a14">
+          <p:sp>
+            <p:nvSpPr>
+              <p:cNvPr id="20" name="TextBox 19">
+                <a:extLst>
+                  <a:ext uri="{FF2B5EF4-FFF2-40B4-BE49-F238E27FC236}">
+                    <a16:creationId xmlns:a16="http://schemas.microsoft.com/office/drawing/2014/main" id="{28C9A428-C646-41CF-A733-C9496549128D}"/>
+                  </a:ext>
+                </a:extLst>
+              </p:cNvPr>
+              <p:cNvSpPr txBox="1"/>
+              <p:nvPr/>
+            </p:nvSpPr>
+            <p:spPr>
+              <a:xfrm>
+                <a:off x="7331291" y="5729534"/>
+                <a:ext cx="4770024" cy="1004634"/>
+              </a:xfrm>
+              <a:prstGeom prst="rect">
+                <a:avLst/>
+              </a:prstGeom>
+              <a:noFill/>
+            </p:spPr>
+            <p:txBody>
+              <a:bodyPr wrap="none" lIns="0" tIns="0" rIns="0" bIns="0" rtlCol="0">
+                <a:spAutoFit/>
+              </a:bodyPr>
+              <a:lstStyle/>
+              <a:p>
+                <a:pPr/>
+                <a14:m>
+                  <m:oMath xmlns:m="http://schemas.openxmlformats.org/officeDocument/2006/math">
+                    <m:sSub>
+                      <m:sSubPr>
+                        <m:ctrlPr>
+                          <a:rPr kumimoji="1" lang="en-US" altLang="ja-JP" sz="1600" b="1" i="1" smtClean="0">
+                            <a:solidFill>
+                              <a:srgbClr val="212733"/>
+                            </a:solidFill>
+                            <a:latin typeface="Cambria Math" panose="02040503050406030204" pitchFamily="18" charset="0"/>
+                            <a:ea typeface="+mn-ea"/>
+                            <a:cs typeface="Arial" panose="020B0604020202020204" pitchFamily="34" charset="0"/>
+                          </a:rPr>
+                        </m:ctrlPr>
+                      </m:sSubPr>
+                      <m:e>
+                        <m:r>
+                          <m:rPr>
+                            <m:nor/>
+                          </m:rPr>
+                          <a:rPr kumimoji="1" lang="en-US" altLang="ja-JP" sz="1600" b="1" i="0" smtClean="0">
+                            <a:solidFill>
+                              <a:srgbClr val="212733"/>
+                            </a:solidFill>
+                            <a:latin typeface="Cambria Math" panose="02040503050406030204" pitchFamily="18" charset="0"/>
+                            <a:ea typeface="+mn-ea"/>
+                            <a:cs typeface="Arial" panose="020B0604020202020204" pitchFamily="34" charset="0"/>
+                          </a:rPr>
+                          <m:t>T</m:t>
+                        </m:r>
+                      </m:e>
+                      <m:sub>
+                        <m:r>
+                          <a:rPr kumimoji="1" lang="en-US" altLang="ja-JP" sz="1600" b="0" i="1" smtClean="0">
+                            <a:solidFill>
+                              <a:srgbClr val="212733"/>
+                            </a:solidFill>
+                            <a:latin typeface="Cambria Math" panose="02040503050406030204" pitchFamily="18" charset="0"/>
+                            <a:ea typeface="+mn-ea"/>
+                            <a:cs typeface="Arial" panose="020B0604020202020204" pitchFamily="34" charset="0"/>
+                          </a:rPr>
+                          <m:t>𝑎𝑙𝑙</m:t>
+                        </m:r>
+                      </m:sub>
+                    </m:sSub>
+                  </m:oMath>
+                </a14:m>
+                <a:r>
+                  <a:rPr kumimoji="1" lang="en-US" altLang="ja-JP" sz="1600" dirty="0">
+                    <a:solidFill>
+                      <a:srgbClr val="212733"/>
+                    </a:solidFill>
+                    <a:latin typeface="Cambria Math" panose="02040503050406030204" pitchFamily="18" charset="0"/>
+                    <a:ea typeface="+mn-ea"/>
+                    <a:cs typeface="Arial" panose="020B0604020202020204" pitchFamily="34" charset="0"/>
+                  </a:rPr>
+                  <a:t>:Transfer matrix of entire system</a:t>
+                </a:r>
+              </a:p>
+              <a:p>
+                <a14:m>
+                  <m:oMath xmlns:m="http://schemas.openxmlformats.org/officeDocument/2006/math">
+                    <m:sSub>
+                      <m:sSubPr>
+                        <m:ctrlPr>
+                          <a:rPr kumimoji="1" lang="en-US" altLang="ja-JP" sz="1600" i="1" smtClean="0">
+                            <a:solidFill>
+                              <a:srgbClr val="212733"/>
+                            </a:solidFill>
+                            <a:latin typeface="Cambria Math" panose="02040503050406030204" pitchFamily="18" charset="0"/>
+                            <a:ea typeface="+mn-ea"/>
+                            <a:cs typeface="Arial" panose="020B0604020202020204" pitchFamily="34" charset="0"/>
+                          </a:rPr>
+                        </m:ctrlPr>
+                      </m:sSubPr>
+                      <m:e>
+                        <m:r>
+                          <m:rPr>
+                            <m:nor/>
+                          </m:rPr>
+                          <a:rPr lang="en-US" altLang="ja-JP" sz="1600" b="1" i="0" smtClean="0">
+                            <a:solidFill>
+                              <a:srgbClr val="212733"/>
+                            </a:solidFill>
+                            <a:latin typeface="Cambria Math" panose="02040503050406030204" pitchFamily="18" charset="0"/>
+                            <a:cs typeface="Arial" panose="020B0604020202020204" pitchFamily="34" charset="0"/>
+                          </a:rPr>
+                          <m:t>T</m:t>
+                        </m:r>
+                      </m:e>
+                      <m:sub>
+                        <m:r>
+                          <a:rPr kumimoji="1" lang="en-US" altLang="ja-JP" sz="1600" b="0" i="1" smtClean="0">
+                            <a:solidFill>
+                              <a:srgbClr val="212733"/>
+                            </a:solidFill>
+                            <a:latin typeface="Cambria Math" panose="02040503050406030204" pitchFamily="18" charset="0"/>
+                            <a:ea typeface="+mn-ea"/>
+                            <a:cs typeface="Arial" panose="020B0604020202020204" pitchFamily="34" charset="0"/>
+                          </a:rPr>
+                          <m:t>𝑓</m:t>
+                        </m:r>
+                      </m:sub>
+                    </m:sSub>
+                  </m:oMath>
+                </a14:m>
+                <a:r>
+                  <a:rPr lang="en-US" altLang="ja-JP" sz="1600" dirty="0">
+                    <a:solidFill>
+                      <a:srgbClr val="212733"/>
+                    </a:solidFill>
+                    <a:latin typeface="Cambria Math" panose="02040503050406030204" pitchFamily="18" charset="0"/>
+                    <a:cs typeface="Arial" panose="020B0604020202020204" pitchFamily="34" charset="0"/>
+                  </a:rPr>
+                  <a:t>:   Transfer matrix of forward propagation</a:t>
+                </a:r>
+              </a:p>
+              <a:p>
+                <a:pPr/>
+                <a14:m>
+                  <m:oMath xmlns:m="http://schemas.openxmlformats.org/officeDocument/2006/math">
+                    <m:sSub>
+                      <m:sSubPr>
+                        <m:ctrlPr>
+                          <a:rPr lang="en-US" altLang="ja-JP" sz="1600" b="1" i="1">
+                            <a:solidFill>
+                              <a:srgbClr val="212733"/>
+                            </a:solidFill>
+                            <a:latin typeface="Cambria Math" panose="02040503050406030204" pitchFamily="18" charset="0"/>
+                            <a:cs typeface="Arial" panose="020B0604020202020204" pitchFamily="34" charset="0"/>
+                          </a:rPr>
+                        </m:ctrlPr>
+                      </m:sSubPr>
+                      <m:e>
+                        <m:r>
+                          <a:rPr lang="en-US" altLang="ja-JP" sz="1600" b="1" i="0" smtClean="0">
+                            <a:solidFill>
+                              <a:srgbClr val="212733"/>
+                            </a:solidFill>
+                            <a:latin typeface="Cambria Math" panose="02040503050406030204" pitchFamily="18" charset="0"/>
+                            <a:cs typeface="Arial" panose="020B0604020202020204" pitchFamily="34" charset="0"/>
+                          </a:rPr>
+                          <m:t>𝐓</m:t>
+                        </m:r>
+                      </m:e>
+                      <m:sub>
+                        <m:r>
+                          <a:rPr lang="en-US" altLang="ja-JP" sz="1600" i="1">
+                            <a:solidFill>
+                              <a:srgbClr val="212733"/>
+                            </a:solidFill>
+                            <a:latin typeface="Cambria Math" panose="02040503050406030204" pitchFamily="18" charset="0"/>
+                            <a:cs typeface="Arial" panose="020B0604020202020204" pitchFamily="34" charset="0"/>
+                          </a:rPr>
+                          <m:t>𝑏</m:t>
+                        </m:r>
+                      </m:sub>
+                    </m:sSub>
+                  </m:oMath>
+                </a14:m>
+                <a:r>
+                  <a:rPr lang="en-US" altLang="ja-JP" sz="1600" b="1" i="1" dirty="0">
+                    <a:solidFill>
+                      <a:srgbClr val="212733"/>
+                    </a:solidFill>
+                    <a:latin typeface="Cambria Math" panose="02040503050406030204" pitchFamily="18" charset="0"/>
+                    <a:cs typeface="Arial" panose="020B0604020202020204" pitchFamily="34" charset="0"/>
+                  </a:rPr>
+                  <a:t>:</a:t>
+                </a:r>
+                <a:r>
+                  <a:rPr lang="en-US" altLang="ja-JP" sz="1600" dirty="0">
+                    <a:solidFill>
+                      <a:srgbClr val="212733"/>
+                    </a:solidFill>
+                    <a:latin typeface="Cambria Math" panose="02040503050406030204" pitchFamily="18" charset="0"/>
+                    <a:cs typeface="Arial" panose="020B0604020202020204" pitchFamily="34" charset="0"/>
+                  </a:rPr>
+                  <a:t>  Transfer matrix of backward propagation</a:t>
+                </a:r>
+                <a:endParaRPr lang="en-US" altLang="ja-JP" sz="1600" b="1" i="1" dirty="0">
+                  <a:solidFill>
+                    <a:srgbClr val="212733"/>
+                  </a:solidFill>
+                  <a:latin typeface="Cambria Math" panose="02040503050406030204" pitchFamily="18" charset="0"/>
+                  <a:cs typeface="Arial" panose="020B0604020202020204" pitchFamily="34" charset="0"/>
+                </a:endParaRPr>
+              </a:p>
+              <a:p>
+                <a:pPr/>
+                <a14:m>
+                  <m:oMath xmlns:m="http://schemas.openxmlformats.org/officeDocument/2006/math">
+                    <m:sSub>
+                      <m:sSubPr>
+                        <m:ctrlPr>
+                          <a:rPr lang="en-US" altLang="ja-JP" sz="1600" b="1" i="1" smtClean="0">
+                            <a:solidFill>
+                              <a:srgbClr val="212733"/>
+                            </a:solidFill>
+                            <a:latin typeface="Cambria Math" panose="02040503050406030204" pitchFamily="18" charset="0"/>
+                            <a:cs typeface="Arial" panose="020B0604020202020204" pitchFamily="34" charset="0"/>
+                          </a:rPr>
+                        </m:ctrlPr>
+                      </m:sSubPr>
+                      <m:e>
+                        <m:r>
+                          <m:rPr>
+                            <m:nor/>
+                          </m:rPr>
+                          <a:rPr lang="en-US" altLang="ja-JP" sz="1600" b="1" i="0" smtClean="0">
+                            <a:solidFill>
+                              <a:srgbClr val="212733"/>
+                            </a:solidFill>
+                            <a:latin typeface="Cambria Math" panose="02040503050406030204" pitchFamily="18" charset="0"/>
+                            <a:cs typeface="Arial" panose="020B0604020202020204" pitchFamily="34" charset="0"/>
+                          </a:rPr>
+                          <m:t>T</m:t>
+                        </m:r>
+                      </m:e>
+                      <m:sub>
+                        <m:r>
+                          <a:rPr lang="en-US" altLang="ja-JP" sz="1600" b="0" i="1" smtClean="0">
+                            <a:solidFill>
+                              <a:srgbClr val="212733"/>
+                            </a:solidFill>
+                            <a:latin typeface="Cambria Math" panose="02040503050406030204" pitchFamily="18" charset="0"/>
+                            <a:cs typeface="Arial" panose="020B0604020202020204" pitchFamily="34" charset="0"/>
+                          </a:rPr>
+                          <m:t>𝑟</m:t>
+                        </m:r>
+                      </m:sub>
+                    </m:sSub>
+                  </m:oMath>
+                </a14:m>
+                <a:r>
+                  <a:rPr lang="en-US" altLang="ja-JP" sz="1600" dirty="0">
+                    <a:solidFill>
+                      <a:srgbClr val="212733"/>
+                    </a:solidFill>
+                    <a:latin typeface="Cambria Math" panose="02040503050406030204" pitchFamily="18" charset="0"/>
+                    <a:cs typeface="Arial" panose="020B0604020202020204" pitchFamily="34" charset="0"/>
+                  </a:rPr>
+                  <a:t>:   Transfer matrix of reverting propagation direction</a:t>
+                </a:r>
+                <a:endParaRPr lang="en-US" altLang="ja-JP" sz="1600" b="1" i="1" dirty="0">
+                  <a:solidFill>
+                    <a:srgbClr val="212733"/>
+                  </a:solidFill>
+                  <a:latin typeface="Cambria Math" panose="02040503050406030204" pitchFamily="18" charset="0"/>
+                  <a:cs typeface="Arial" panose="020B0604020202020204" pitchFamily="34" charset="0"/>
+                </a:endParaRPr>
+              </a:p>
+            </p:txBody>
+          </p:sp>
+        </mc:Choice>
+        <mc:Fallback>
+          <p:sp>
+            <p:nvSpPr>
+              <p:cNvPr id="20" name="TextBox 19">
+                <a:extLst>
+                  <a:ext uri="{FF2B5EF4-FFF2-40B4-BE49-F238E27FC236}">
+                    <a16:creationId xmlns:a16="http://schemas.microsoft.com/office/drawing/2014/main" id="{28C9A428-C646-41CF-A733-C9496549128D}"/>
+                  </a:ext>
+                </a:extLst>
+              </p:cNvPr>
+              <p:cNvSpPr txBox="1">
+                <a:spLocks noRot="1" noChangeAspect="1" noMove="1" noResize="1" noEditPoints="1" noAdjustHandles="1" noChangeArrowheads="1" noChangeShapeType="1" noTextEdit="1"/>
+              </p:cNvSpPr>
+              <p:nvPr/>
+            </p:nvSpPr>
+            <p:spPr>
+              <a:xfrm>
+                <a:off x="7331291" y="5729534"/>
+                <a:ext cx="4770024" cy="1004634"/>
+              </a:xfrm>
+              <a:prstGeom prst="rect">
+                <a:avLst/>
+              </a:prstGeom>
+              <a:blipFill>
+                <a:blip r:embed="rId10"/>
+                <a:stretch>
+                  <a:fillRect l="-1535" t="-7273" r="-1535" b="-10909"/>
+                </a:stretch>
+              </a:blipFill>
+            </p:spPr>
+            <p:txBody>
+              <a:bodyPr/>
+              <a:lstStyle/>
+              <a:p>
+                <a:r>
+                  <a:rPr lang="ja-JP" altLang="en-US">
+                    <a:noFill/>
+                  </a:rPr>
+                  <a:t> </a:t>
+                </a:r>
+              </a:p>
+            </p:txBody>
+          </p:sp>
+        </mc:Fallback>
+      </mc:AlternateContent>
+      <p:grpSp>
+        <p:nvGrpSpPr>
+          <p:cNvPr id="30" name="Group 29">
+            <a:extLst>
+              <a:ext uri="{FF2B5EF4-FFF2-40B4-BE49-F238E27FC236}">
+                <a16:creationId xmlns:a16="http://schemas.microsoft.com/office/drawing/2014/main" id="{398FD62E-93C0-4355-85DB-0C0AECB2B244}"/>
+              </a:ext>
+            </a:extLst>
+          </p:cNvPr>
+          <p:cNvGrpSpPr/>
+          <p:nvPr/>
+        </p:nvGrpSpPr>
+        <p:grpSpPr>
+          <a:xfrm>
+            <a:off x="8484824" y="2240292"/>
+            <a:ext cx="425138" cy="585262"/>
+            <a:chOff x="7889768" y="2242357"/>
+            <a:chExt cx="425138" cy="585262"/>
+          </a:xfrm>
+        </p:grpSpPr>
+        <p:cxnSp>
+          <p:nvCxnSpPr>
+            <p:cNvPr id="31" name="Straight Arrow Connector 30">
+              <a:extLst>
+                <a:ext uri="{FF2B5EF4-FFF2-40B4-BE49-F238E27FC236}">
+                  <a16:creationId xmlns:a16="http://schemas.microsoft.com/office/drawing/2014/main" id="{A311CBCF-77FD-4CC7-AFCE-A21C64142672}"/>
+                </a:ext>
+              </a:extLst>
+            </p:cNvPr>
+            <p:cNvCxnSpPr>
+              <a:cxnSpLocks/>
+            </p:cNvCxnSpPr>
+            <p:nvPr/>
+          </p:nvCxnSpPr>
+          <p:spPr bwMode="auto">
+            <a:xfrm>
+              <a:off x="7889768" y="2618541"/>
+              <a:ext cx="425138" cy="0"/>
+            </a:xfrm>
+            <a:prstGeom prst="straightConnector1">
+              <a:avLst/>
+            </a:prstGeom>
+            <a:noFill/>
+            <a:ln w="12700" cap="flat" cmpd="sng" algn="ctr">
+              <a:solidFill>
+                <a:srgbClr val="212733"/>
+              </a:solidFill>
+              <a:prstDash val="solid"/>
+              <a:round/>
+              <a:headEnd type="none" w="med" len="med"/>
+              <a:tailEnd type="triangle"/>
+            </a:ln>
+            <a:effectLst/>
+          </p:spPr>
+        </p:cxnSp>
+        <p:cxnSp>
+          <p:nvCxnSpPr>
+            <p:cNvPr id="32" name="Straight Arrow Connector 31">
+              <a:extLst>
+                <a:ext uri="{FF2B5EF4-FFF2-40B4-BE49-F238E27FC236}">
+                  <a16:creationId xmlns:a16="http://schemas.microsoft.com/office/drawing/2014/main" id="{921DAB27-ECB3-4D91-A456-626AAD933CBA}"/>
+                </a:ext>
+              </a:extLst>
+            </p:cNvPr>
+            <p:cNvCxnSpPr>
+              <a:cxnSpLocks/>
+            </p:cNvCxnSpPr>
+            <p:nvPr/>
+          </p:nvCxnSpPr>
+          <p:spPr bwMode="auto">
+            <a:xfrm>
+              <a:off x="7889768" y="2618541"/>
+              <a:ext cx="209078" cy="209078"/>
+            </a:xfrm>
+            <a:prstGeom prst="straightConnector1">
+              <a:avLst/>
+            </a:prstGeom>
+            <a:noFill/>
+            <a:ln w="12700" cap="flat" cmpd="sng" algn="ctr">
+              <a:solidFill>
+                <a:srgbClr val="212733"/>
+              </a:solidFill>
+              <a:prstDash val="solid"/>
+              <a:round/>
+              <a:headEnd type="none" w="med" len="med"/>
+              <a:tailEnd type="triangle"/>
+            </a:ln>
+            <a:effectLst/>
+          </p:spPr>
+        </p:cxnSp>
+        <p:cxnSp>
+          <p:nvCxnSpPr>
+            <p:cNvPr id="33" name="Straight Arrow Connector 32">
+              <a:extLst>
+                <a:ext uri="{FF2B5EF4-FFF2-40B4-BE49-F238E27FC236}">
+                  <a16:creationId xmlns:a16="http://schemas.microsoft.com/office/drawing/2014/main" id="{860154D0-5F8D-4D8C-9CE9-4B78A3585ACB}"/>
+                </a:ext>
+              </a:extLst>
+            </p:cNvPr>
+            <p:cNvCxnSpPr>
+              <a:cxnSpLocks/>
+            </p:cNvCxnSpPr>
+            <p:nvPr/>
+          </p:nvCxnSpPr>
+          <p:spPr bwMode="auto">
+            <a:xfrm flipV="1">
+              <a:off x="7889768" y="2242357"/>
+              <a:ext cx="0" cy="376184"/>
+            </a:xfrm>
+            <a:prstGeom prst="straightConnector1">
+              <a:avLst/>
+            </a:prstGeom>
+            <a:noFill/>
+            <a:ln w="12700" cap="flat" cmpd="sng" algn="ctr">
+              <a:solidFill>
+                <a:srgbClr val="212733"/>
+              </a:solidFill>
+              <a:prstDash val="solid"/>
+              <a:round/>
+              <a:headEnd type="none" w="med" len="med"/>
+              <a:tailEnd type="triangle"/>
+            </a:ln>
+            <a:effectLst/>
+          </p:spPr>
+        </p:cxnSp>
+      </p:grpSp>
+    </p:spTree>
+    <p:extLst>
+      <p:ext uri="{BB962C8B-B14F-4D97-AF65-F5344CB8AC3E}">
+        <p14:creationId xmlns:p14="http://schemas.microsoft.com/office/powerpoint/2010/main" val="3906750084"/>
+      </p:ext>
+    </p:extLst>
+  </p:cSld>
+  <p:clrMapOvr>
+    <a:masterClrMapping/>
+  </p:clrMapOvr>
+</p:sld>
+</file>
+
+<file path=ppt/slides/slide8.xml><?xml version="1.0" encoding="utf-8"?>
 <p:sld xmlns:a="http://schemas.openxmlformats.org/drawingml/2006/main" xmlns:r="http://schemas.openxmlformats.org/officeDocument/2006/relationships" xmlns:p="http://schemas.openxmlformats.org/presentationml/2006/main">
   <p:cSld>
     <p:spTree>
@@ -29634,7 +33002,7 @@
 </p:sld>
 </file>
 
-<file path=ppt/slides/slide8.xml><?xml version="1.0" encoding="utf-8"?>
+<file path=ppt/slides/slide9.xml><?xml version="1.0" encoding="utf-8"?>
 <p:sld xmlns:a="http://schemas.openxmlformats.org/drawingml/2006/main" xmlns:r="http://schemas.openxmlformats.org/officeDocument/2006/relationships" xmlns:p="http://schemas.openxmlformats.org/presentationml/2006/main">
   <p:cSld>
     <p:spTree>

</xml_diff>